<commit_message>
Updated figs before submission
</commit_message>
<xml_diff>
--- a/images/fig_2_2.pptx
+++ b/images/fig_2_2.pptx
@@ -9,9 +9,9 @@
     <p:notesMasterId r:id="rId4"/>
   </p:notesMasterIdLst>
   <p:sldIdLst>
-    <p:sldId id="257" r:id="rId3"/>
+    <p:sldId id="258" r:id="rId3"/>
   </p:sldIdLst>
-  <p:sldSz cx="12801600" cy="8229600"/>
+  <p:sldSz cx="12801600" cy="5486400"/>
   <p:notesSz cx="6858000" cy="9144000"/>
   <p:defaultTextStyle>
     <a:defPPr>
@@ -198,7 +198,7 @@
           <a:p>
             <a:fld id="{2B29D146-947A-4640-AB28-9C382723D282}" type="datetimeFigureOut">
               <a:rPr lang="en-IE" smtClean="0"/>
-              <a:t>14/09/2022</a:t>
+              <a:t>02/11/2022</a:t>
             </a:fld>
             <a:endParaRPr lang="en-IE"/>
           </a:p>
@@ -216,8 +216,8 @@
         </p:nvSpPr>
         <p:spPr>
           <a:xfrm>
-            <a:off x="1028700" y="1143000"/>
-            <a:ext cx="4800600" cy="3086100"/>
+            <a:off x="-171450" y="1143000"/>
+            <a:ext cx="7200900" cy="3086100"/>
           </a:xfrm>
           <a:prstGeom prst="rect">
             <a:avLst/>
@@ -495,8 +495,8 @@
         </p:nvSpPr>
         <p:spPr>
           <a:xfrm>
-            <a:off x="1028700" y="1143000"/>
-            <a:ext cx="4800600" cy="3086100"/>
+            <a:off x="-171450" y="1143000"/>
+            <a:ext cx="7200900" cy="3086100"/>
           </a:xfrm>
         </p:spPr>
       </p:sp>
@@ -546,7 +546,7 @@
     </p:spTree>
     <p:extLst>
       <p:ext uri="{BB962C8B-B14F-4D97-AF65-F5344CB8AC3E}">
-        <p14:creationId xmlns:p14="http://schemas.microsoft.com/office/powerpoint/2010/main" val="4059780476"/>
+        <p14:creationId xmlns:p14="http://schemas.microsoft.com/office/powerpoint/2010/main" val="602497123"/>
       </p:ext>
     </p:extLst>
   </p:cSld>
@@ -585,8 +585,8 @@
         </p:nvSpPr>
         <p:spPr>
           <a:xfrm>
-            <a:off x="1600200" y="1346836"/>
-            <a:ext cx="9601200" cy="2865121"/>
+            <a:off x="1600200" y="897891"/>
+            <a:ext cx="9601200" cy="1910081"/>
           </a:xfrm>
         </p:spPr>
         <p:txBody>
@@ -617,8 +617,8 @@
         </p:nvSpPr>
         <p:spPr>
           <a:xfrm>
-            <a:off x="1600200" y="4322446"/>
-            <a:ext cx="9601200" cy="1986914"/>
+            <a:off x="1600200" y="2881631"/>
+            <a:ext cx="9601200" cy="1324609"/>
           </a:xfrm>
         </p:spPr>
         <p:txBody>
@@ -687,7 +687,7 @@
           <a:p>
             <a:fld id="{C2B2A582-90CC-4FCC-844F-FB93A505CA4F}" type="datetimeFigureOut">
               <a:rPr lang="en-IE" smtClean="0"/>
-              <a:t>14/09/2022</a:t>
+              <a:t>02/11/2022</a:t>
             </a:fld>
             <a:endParaRPr lang="en-IE"/>
           </a:p>
@@ -857,7 +857,7 @@
           <a:p>
             <a:fld id="{C2B2A582-90CC-4FCC-844F-FB93A505CA4F}" type="datetimeFigureOut">
               <a:rPr lang="en-IE" smtClean="0"/>
-              <a:t>14/09/2022</a:t>
+              <a:t>02/11/2022</a:t>
             </a:fld>
             <a:endParaRPr lang="en-IE"/>
           </a:p>
@@ -947,8 +947,8 @@
         </p:nvSpPr>
         <p:spPr>
           <a:xfrm>
-            <a:off x="9161148" y="438150"/>
-            <a:ext cx="2760345" cy="6974206"/>
+            <a:off x="9161149" y="292100"/>
+            <a:ext cx="2760345" cy="4649471"/>
           </a:xfrm>
         </p:spPr>
         <p:txBody>
@@ -975,8 +975,8 @@
         </p:nvSpPr>
         <p:spPr>
           <a:xfrm>
-            <a:off x="880113" y="438150"/>
-            <a:ext cx="8121015" cy="6974206"/>
+            <a:off x="880114" y="292100"/>
+            <a:ext cx="8121015" cy="4649471"/>
           </a:xfrm>
         </p:spPr>
         <p:txBody>
@@ -1037,7 +1037,7 @@
           <a:p>
             <a:fld id="{C2B2A582-90CC-4FCC-844F-FB93A505CA4F}" type="datetimeFigureOut">
               <a:rPr lang="en-IE" smtClean="0"/>
-              <a:t>14/09/2022</a:t>
+              <a:t>02/11/2022</a:t>
             </a:fld>
             <a:endParaRPr lang="en-IE"/>
           </a:p>
@@ -1127,8 +1127,8 @@
         </p:nvSpPr>
         <p:spPr>
           <a:xfrm>
-            <a:off x="960120" y="2556514"/>
-            <a:ext cx="10881360" cy="1764029"/>
+            <a:off x="960120" y="1704343"/>
+            <a:ext cx="10881360" cy="1176019"/>
           </a:xfrm>
         </p:spPr>
         <p:txBody>
@@ -1155,8 +1155,8 @@
         </p:nvSpPr>
         <p:spPr>
           <a:xfrm>
-            <a:off x="1920240" y="4663440"/>
-            <a:ext cx="8961120" cy="2103120"/>
+            <a:off x="1920240" y="3108960"/>
+            <a:ext cx="8961120" cy="1402080"/>
           </a:xfrm>
         </p:spPr>
         <p:txBody>
@@ -1286,7 +1286,7 @@
                 </a:solidFill>
               </a:rPr>
               <a:pPr/>
-              <a:t>9/14/22</a:t>
+              <a:t>11/2/22</a:t>
             </a:fld>
             <a:endParaRPr lang="en-IE">
               <a:solidFill>
@@ -1488,7 +1488,7 @@
                 </a:solidFill>
               </a:rPr>
               <a:pPr/>
-              <a:t>9/14/22</a:t>
+              <a:t>11/2/22</a:t>
             </a:fld>
             <a:endParaRPr lang="en-IE">
               <a:solidFill>
@@ -1603,8 +1603,8 @@
         </p:nvSpPr>
         <p:spPr>
           <a:xfrm>
-            <a:off x="1011239" y="5288282"/>
-            <a:ext cx="10881360" cy="1634490"/>
+            <a:off x="1011239" y="3525521"/>
+            <a:ext cx="10881360" cy="1089660"/>
           </a:xfrm>
         </p:spPr>
         <p:txBody>
@@ -1635,8 +1635,8 @@
         </p:nvSpPr>
         <p:spPr>
           <a:xfrm>
-            <a:off x="1011239" y="3488060"/>
-            <a:ext cx="10881360" cy="1800224"/>
+            <a:off x="1011239" y="2325374"/>
+            <a:ext cx="10881360" cy="1200149"/>
           </a:xfrm>
         </p:spPr>
         <p:txBody>
@@ -1766,7 +1766,7 @@
                 </a:solidFill>
               </a:rPr>
               <a:pPr/>
-              <a:t>9/14/22</a:t>
+              <a:t>11/2/22</a:t>
             </a:fld>
             <a:endParaRPr lang="en-IE">
               <a:solidFill>
@@ -1904,8 +1904,8 @@
         </p:nvSpPr>
         <p:spPr>
           <a:xfrm>
-            <a:off x="640080" y="1920243"/>
-            <a:ext cx="5654040" cy="5431156"/>
+            <a:off x="640080" y="1280162"/>
+            <a:ext cx="5654040" cy="3620771"/>
           </a:xfrm>
         </p:spPr>
         <p:txBody>
@@ -1989,8 +1989,8 @@
         </p:nvSpPr>
         <p:spPr>
           <a:xfrm>
-            <a:off x="6507480" y="1920243"/>
-            <a:ext cx="5654040" cy="5431156"/>
+            <a:off x="6507480" y="1280162"/>
+            <a:ext cx="5654040" cy="3620771"/>
           </a:xfrm>
         </p:spPr>
         <p:txBody>
@@ -2086,7 +2086,7 @@
                 </a:solidFill>
               </a:rPr>
               <a:pPr/>
-              <a:t>9/14/22</a:t>
+              <a:t>11/2/22</a:t>
             </a:fld>
             <a:endParaRPr lang="en-IE">
               <a:solidFill>
@@ -2228,8 +2228,8 @@
         </p:nvSpPr>
         <p:spPr>
           <a:xfrm>
-            <a:off x="640084" y="1842136"/>
-            <a:ext cx="5656263" cy="767715"/>
+            <a:off x="640085" y="1228091"/>
+            <a:ext cx="5656263" cy="511810"/>
           </a:xfrm>
         </p:spPr>
         <p:txBody>
@@ -2293,8 +2293,8 @@
         </p:nvSpPr>
         <p:spPr>
           <a:xfrm>
-            <a:off x="640084" y="2609851"/>
-            <a:ext cx="5656263" cy="4741545"/>
+            <a:off x="640085" y="1739901"/>
+            <a:ext cx="5656263" cy="3161030"/>
           </a:xfrm>
         </p:spPr>
         <p:txBody>
@@ -2378,8 +2378,8 @@
         </p:nvSpPr>
         <p:spPr>
           <a:xfrm>
-            <a:off x="6503040" y="1842136"/>
-            <a:ext cx="5658485" cy="767715"/>
+            <a:off x="6503041" y="1228091"/>
+            <a:ext cx="5658485" cy="511810"/>
           </a:xfrm>
         </p:spPr>
         <p:txBody>
@@ -2443,8 +2443,8 @@
         </p:nvSpPr>
         <p:spPr>
           <a:xfrm>
-            <a:off x="6503040" y="2609851"/>
-            <a:ext cx="5658485" cy="4741545"/>
+            <a:off x="6503041" y="1739901"/>
+            <a:ext cx="5658485" cy="3161030"/>
           </a:xfrm>
         </p:spPr>
         <p:txBody>
@@ -2540,7 +2540,7 @@
                 </a:solidFill>
               </a:rPr>
               <a:pPr/>
-              <a:t>9/14/22</a:t>
+              <a:t>11/2/22</a:t>
             </a:fld>
             <a:endParaRPr lang="en-IE">
               <a:solidFill>
@@ -2690,7 +2690,7 @@
                 </a:solidFill>
               </a:rPr>
               <a:pPr/>
-              <a:t>9/14/22</a:t>
+              <a:t>11/2/22</a:t>
             </a:fld>
             <a:endParaRPr lang="en-IE">
               <a:solidFill>
@@ -2817,7 +2817,7 @@
                 </a:solidFill>
               </a:rPr>
               <a:pPr/>
-              <a:t>9/14/22</a:t>
+              <a:t>11/2/22</a:t>
             </a:fld>
             <a:endParaRPr lang="en-IE">
               <a:solidFill>
@@ -2932,8 +2932,8 @@
         </p:nvSpPr>
         <p:spPr>
           <a:xfrm>
-            <a:off x="640086" y="327661"/>
-            <a:ext cx="4211639" cy="1394460"/>
+            <a:off x="640087" y="218441"/>
+            <a:ext cx="4211639" cy="929640"/>
           </a:xfrm>
         </p:spPr>
         <p:txBody>
@@ -2964,8 +2964,8 @@
         </p:nvSpPr>
         <p:spPr>
           <a:xfrm>
-            <a:off x="5005073" y="327664"/>
-            <a:ext cx="7156452" cy="7023736"/>
+            <a:off x="5005073" y="218443"/>
+            <a:ext cx="7156452" cy="4682491"/>
           </a:xfrm>
         </p:spPr>
         <p:txBody>
@@ -3049,8 +3049,8 @@
         </p:nvSpPr>
         <p:spPr>
           <a:xfrm>
-            <a:off x="640086" y="1722124"/>
-            <a:ext cx="4211639" cy="5629276"/>
+            <a:off x="640087" y="1148083"/>
+            <a:ext cx="4211639" cy="3752851"/>
           </a:xfrm>
         </p:spPr>
         <p:txBody>
@@ -3126,7 +3126,7 @@
                 </a:solidFill>
               </a:rPr>
               <a:pPr/>
-              <a:t>9/14/22</a:t>
+              <a:t>11/2/22</a:t>
             </a:fld>
             <a:endParaRPr lang="en-IE">
               <a:solidFill>
@@ -3321,7 +3321,7 @@
           <a:p>
             <a:fld id="{C2B2A582-90CC-4FCC-844F-FB93A505CA4F}" type="datetimeFigureOut">
               <a:rPr lang="en-IE" smtClean="0"/>
-              <a:t>14/09/2022</a:t>
+              <a:t>02/11/2022</a:t>
             </a:fld>
             <a:endParaRPr lang="en-IE"/>
           </a:p>
@@ -3411,8 +3411,8 @@
         </p:nvSpPr>
         <p:spPr>
           <a:xfrm>
-            <a:off x="2509203" y="5760722"/>
-            <a:ext cx="7680960" cy="680086"/>
+            <a:off x="2509203" y="3840481"/>
+            <a:ext cx="7680960" cy="453391"/>
           </a:xfrm>
         </p:spPr>
         <p:txBody>
@@ -3443,8 +3443,8 @@
         </p:nvSpPr>
         <p:spPr>
           <a:xfrm>
-            <a:off x="2509203" y="735329"/>
-            <a:ext cx="7680960" cy="4937760"/>
+            <a:off x="2509203" y="490219"/>
+            <a:ext cx="7680960" cy="3291840"/>
           </a:xfrm>
         </p:spPr>
         <p:txBody>
@@ -3504,8 +3504,8 @@
         </p:nvSpPr>
         <p:spPr>
           <a:xfrm>
-            <a:off x="2509203" y="6440808"/>
-            <a:ext cx="7680960" cy="965834"/>
+            <a:off x="2509203" y="4293872"/>
+            <a:ext cx="7680960" cy="643889"/>
           </a:xfrm>
         </p:spPr>
         <p:txBody>
@@ -3581,7 +3581,7 @@
                 </a:solidFill>
               </a:rPr>
               <a:pPr/>
-              <a:t>9/14/22</a:t>
+              <a:t>11/2/22</a:t>
             </a:fld>
             <a:endParaRPr lang="en-IE">
               <a:solidFill>
@@ -3783,7 +3783,7 @@
                 </a:solidFill>
               </a:rPr>
               <a:pPr/>
-              <a:t>9/14/22</a:t>
+              <a:t>11/2/22</a:t>
             </a:fld>
             <a:endParaRPr lang="en-IE">
               <a:solidFill>
@@ -3898,8 +3898,8 @@
         </p:nvSpPr>
         <p:spPr>
           <a:xfrm>
-            <a:off x="9281160" y="329570"/>
-            <a:ext cx="2880360" cy="7021829"/>
+            <a:off x="9281160" y="219714"/>
+            <a:ext cx="2880360" cy="4681219"/>
           </a:xfrm>
         </p:spPr>
         <p:txBody>
@@ -3926,8 +3926,8 @@
         </p:nvSpPr>
         <p:spPr>
           <a:xfrm>
-            <a:off x="640080" y="329570"/>
-            <a:ext cx="8427720" cy="7021829"/>
+            <a:off x="640080" y="219714"/>
+            <a:ext cx="8427720" cy="4681219"/>
           </a:xfrm>
         </p:spPr>
         <p:txBody>
@@ -3995,7 +3995,7 @@
                 </a:solidFill>
               </a:rPr>
               <a:pPr/>
-              <a:t>9/14/22</a:t>
+              <a:t>11/2/22</a:t>
             </a:fld>
             <a:endParaRPr lang="en-IE">
               <a:solidFill>
@@ -4110,8 +4110,8 @@
         </p:nvSpPr>
         <p:spPr>
           <a:xfrm>
-            <a:off x="873443" y="2051687"/>
-            <a:ext cx="11041380" cy="3423284"/>
+            <a:off x="873443" y="1367792"/>
+            <a:ext cx="11041380" cy="2282189"/>
           </a:xfrm>
         </p:spPr>
         <p:txBody>
@@ -4142,8 +4142,8 @@
         </p:nvSpPr>
         <p:spPr>
           <a:xfrm>
-            <a:off x="873443" y="5507358"/>
-            <a:ext cx="11041380" cy="1800224"/>
+            <a:off x="873443" y="3671572"/>
+            <a:ext cx="11041380" cy="1200149"/>
           </a:xfrm>
         </p:spPr>
         <p:txBody>
@@ -4266,7 +4266,7 @@
           <a:p>
             <a:fld id="{C2B2A582-90CC-4FCC-844F-FB93A505CA4F}" type="datetimeFigureOut">
               <a:rPr lang="en-IE" smtClean="0"/>
-              <a:t>14/09/2022</a:t>
+              <a:t>02/11/2022</a:t>
             </a:fld>
             <a:endParaRPr lang="en-IE"/>
           </a:p>
@@ -4379,8 +4379,8 @@
         </p:nvSpPr>
         <p:spPr>
           <a:xfrm>
-            <a:off x="880110" y="2190753"/>
-            <a:ext cx="5440680" cy="5221605"/>
+            <a:off x="880110" y="1460502"/>
+            <a:ext cx="5440680" cy="3481070"/>
           </a:xfrm>
         </p:spPr>
         <p:txBody>
@@ -4436,8 +4436,8 @@
         </p:nvSpPr>
         <p:spPr>
           <a:xfrm>
-            <a:off x="6480810" y="2190753"/>
-            <a:ext cx="5440680" cy="5221605"/>
+            <a:off x="6480810" y="1460502"/>
+            <a:ext cx="5440680" cy="3481070"/>
           </a:xfrm>
         </p:spPr>
         <p:txBody>
@@ -4498,7 +4498,7 @@
           <a:p>
             <a:fld id="{C2B2A582-90CC-4FCC-844F-FB93A505CA4F}" type="datetimeFigureOut">
               <a:rPr lang="en-IE" smtClean="0"/>
-              <a:t>14/09/2022</a:t>
+              <a:t>02/11/2022</a:t>
             </a:fld>
             <a:endParaRPr lang="en-IE"/>
           </a:p>
@@ -4588,8 +4588,8 @@
         </p:nvSpPr>
         <p:spPr>
           <a:xfrm>
-            <a:off x="881778" y="438150"/>
-            <a:ext cx="11041380" cy="1590676"/>
+            <a:off x="881778" y="292100"/>
+            <a:ext cx="11041380" cy="1060451"/>
           </a:xfrm>
         </p:spPr>
         <p:txBody>
@@ -4616,8 +4616,8 @@
         </p:nvSpPr>
         <p:spPr>
           <a:xfrm>
-            <a:off x="881780" y="2017397"/>
-            <a:ext cx="5415676" cy="988694"/>
+            <a:off x="881780" y="1344932"/>
+            <a:ext cx="5415676" cy="659129"/>
           </a:xfrm>
         </p:spPr>
         <p:txBody>
@@ -4681,8 +4681,8 @@
         </p:nvSpPr>
         <p:spPr>
           <a:xfrm>
-            <a:off x="881780" y="3006091"/>
-            <a:ext cx="5415676" cy="4421505"/>
+            <a:off x="881780" y="2004061"/>
+            <a:ext cx="5415676" cy="2947670"/>
           </a:xfrm>
         </p:spPr>
         <p:txBody>
@@ -4738,8 +4738,8 @@
         </p:nvSpPr>
         <p:spPr>
           <a:xfrm>
-            <a:off x="6480811" y="2017397"/>
-            <a:ext cx="5442348" cy="988694"/>
+            <a:off x="6480811" y="1344932"/>
+            <a:ext cx="5442348" cy="659129"/>
           </a:xfrm>
         </p:spPr>
         <p:txBody>
@@ -4803,8 +4803,8 @@
         </p:nvSpPr>
         <p:spPr>
           <a:xfrm>
-            <a:off x="6480811" y="3006091"/>
-            <a:ext cx="5442348" cy="4421505"/>
+            <a:off x="6480811" y="2004061"/>
+            <a:ext cx="5442348" cy="2947670"/>
           </a:xfrm>
         </p:spPr>
         <p:txBody>
@@ -4865,7 +4865,7 @@
           <a:p>
             <a:fld id="{C2B2A582-90CC-4FCC-844F-FB93A505CA4F}" type="datetimeFigureOut">
               <a:rPr lang="en-IE" smtClean="0"/>
-              <a:t>14/09/2022</a:t>
+              <a:t>02/11/2022</a:t>
             </a:fld>
             <a:endParaRPr lang="en-IE"/>
           </a:p>
@@ -4983,7 +4983,7 @@
           <a:p>
             <a:fld id="{C2B2A582-90CC-4FCC-844F-FB93A505CA4F}" type="datetimeFigureOut">
               <a:rPr lang="en-IE" smtClean="0"/>
-              <a:t>14/09/2022</a:t>
+              <a:t>02/11/2022</a:t>
             </a:fld>
             <a:endParaRPr lang="en-IE"/>
           </a:p>
@@ -5078,7 +5078,7 @@
           <a:p>
             <a:fld id="{C2B2A582-90CC-4FCC-844F-FB93A505CA4F}" type="datetimeFigureOut">
               <a:rPr lang="en-IE" smtClean="0"/>
-              <a:t>14/09/2022</a:t>
+              <a:t>02/11/2022</a:t>
             </a:fld>
             <a:endParaRPr lang="en-IE"/>
           </a:p>
@@ -5168,8 +5168,8 @@
         </p:nvSpPr>
         <p:spPr>
           <a:xfrm>
-            <a:off x="881779" y="548640"/>
-            <a:ext cx="4128849" cy="1920240"/>
+            <a:off x="881780" y="365760"/>
+            <a:ext cx="4128849" cy="1280160"/>
           </a:xfrm>
         </p:spPr>
         <p:txBody>
@@ -5200,8 +5200,8 @@
         </p:nvSpPr>
         <p:spPr>
           <a:xfrm>
-            <a:off x="5442348" y="1184911"/>
-            <a:ext cx="6480810" cy="5848351"/>
+            <a:off x="5442348" y="789941"/>
+            <a:ext cx="6480810" cy="3898901"/>
           </a:xfrm>
         </p:spPr>
         <p:txBody>
@@ -5285,8 +5285,8 @@
         </p:nvSpPr>
         <p:spPr>
           <a:xfrm>
-            <a:off x="881779" y="2468881"/>
-            <a:ext cx="4128849" cy="4573906"/>
+            <a:off x="881780" y="1645921"/>
+            <a:ext cx="4128849" cy="3049271"/>
           </a:xfrm>
         </p:spPr>
         <p:txBody>
@@ -5355,7 +5355,7 @@
           <a:p>
             <a:fld id="{C2B2A582-90CC-4FCC-844F-FB93A505CA4F}" type="datetimeFigureOut">
               <a:rPr lang="en-IE" smtClean="0"/>
-              <a:t>14/09/2022</a:t>
+              <a:t>02/11/2022</a:t>
             </a:fld>
             <a:endParaRPr lang="en-IE"/>
           </a:p>
@@ -5445,8 +5445,8 @@
         </p:nvSpPr>
         <p:spPr>
           <a:xfrm>
-            <a:off x="881779" y="548640"/>
-            <a:ext cx="4128849" cy="1920240"/>
+            <a:off x="881780" y="365760"/>
+            <a:ext cx="4128849" cy="1280160"/>
           </a:xfrm>
         </p:spPr>
         <p:txBody>
@@ -5477,8 +5477,8 @@
         </p:nvSpPr>
         <p:spPr>
           <a:xfrm>
-            <a:off x="5442348" y="1184911"/>
-            <a:ext cx="6480810" cy="5848351"/>
+            <a:off x="5442348" y="789941"/>
+            <a:ext cx="6480810" cy="3898901"/>
           </a:xfrm>
         </p:spPr>
         <p:txBody>
@@ -5538,8 +5538,8 @@
         </p:nvSpPr>
         <p:spPr>
           <a:xfrm>
-            <a:off x="881779" y="2468881"/>
-            <a:ext cx="4128849" cy="4573906"/>
+            <a:off x="881780" y="1645921"/>
+            <a:ext cx="4128849" cy="3049271"/>
           </a:xfrm>
         </p:spPr>
         <p:txBody>
@@ -5608,7 +5608,7 @@
           <a:p>
             <a:fld id="{C2B2A582-90CC-4FCC-844F-FB93A505CA4F}" type="datetimeFigureOut">
               <a:rPr lang="en-IE" smtClean="0"/>
-              <a:t>14/09/2022</a:t>
+              <a:t>02/11/2022</a:t>
             </a:fld>
             <a:endParaRPr lang="en-IE"/>
           </a:p>
@@ -5703,8 +5703,8 @@
         </p:nvSpPr>
         <p:spPr>
           <a:xfrm>
-            <a:off x="880110" y="438150"/>
-            <a:ext cx="11041380" cy="1590676"/>
+            <a:off x="880110" y="292100"/>
+            <a:ext cx="11041380" cy="1060451"/>
           </a:xfrm>
           <a:prstGeom prst="rect">
             <a:avLst/>
@@ -5736,8 +5736,8 @@
         </p:nvSpPr>
         <p:spPr>
           <a:xfrm>
-            <a:off x="880110" y="2190753"/>
-            <a:ext cx="11041380" cy="5221605"/>
+            <a:off x="880110" y="1460502"/>
+            <a:ext cx="11041380" cy="3481070"/>
           </a:xfrm>
           <a:prstGeom prst="rect">
             <a:avLst/>
@@ -5798,8 +5798,8 @@
         </p:nvSpPr>
         <p:spPr>
           <a:xfrm>
-            <a:off x="880110" y="7627622"/>
-            <a:ext cx="2880360" cy="438149"/>
+            <a:off x="880110" y="5085082"/>
+            <a:ext cx="2880360" cy="292099"/>
           </a:xfrm>
           <a:prstGeom prst="rect">
             <a:avLst/>
@@ -5821,7 +5821,7 @@
           <a:p>
             <a:fld id="{C2B2A582-90CC-4FCC-844F-FB93A505CA4F}" type="datetimeFigureOut">
               <a:rPr lang="en-IE" smtClean="0"/>
-              <a:t>14/09/2022</a:t>
+              <a:t>02/11/2022</a:t>
             </a:fld>
             <a:endParaRPr lang="en-IE"/>
           </a:p>
@@ -5839,8 +5839,8 @@
         </p:nvSpPr>
         <p:spPr>
           <a:xfrm>
-            <a:off x="4240530" y="7627622"/>
-            <a:ext cx="4320540" cy="438149"/>
+            <a:off x="4240530" y="5085082"/>
+            <a:ext cx="4320540" cy="292099"/>
           </a:xfrm>
           <a:prstGeom prst="rect">
             <a:avLst/>
@@ -5876,8 +5876,8 @@
         </p:nvSpPr>
         <p:spPr>
           <a:xfrm>
-            <a:off x="9041130" y="7627622"/>
-            <a:ext cx="2880360" cy="438149"/>
+            <a:off x="9041130" y="5085082"/>
+            <a:ext cx="2880360" cy="292099"/>
           </a:xfrm>
           <a:prstGeom prst="rect">
             <a:avLst/>
@@ -6243,8 +6243,8 @@
         </p:nvSpPr>
         <p:spPr>
           <a:xfrm>
-            <a:off x="640080" y="329565"/>
-            <a:ext cx="11521440" cy="1371600"/>
+            <a:off x="640080" y="219710"/>
+            <a:ext cx="11521440" cy="914400"/>
           </a:xfrm>
           <a:prstGeom prst="rect">
             <a:avLst/>
@@ -6276,8 +6276,8 @@
         </p:nvSpPr>
         <p:spPr>
           <a:xfrm>
-            <a:off x="640080" y="1920243"/>
-            <a:ext cx="11521440" cy="5431156"/>
+            <a:off x="640080" y="1280162"/>
+            <a:ext cx="11521440" cy="3620771"/>
           </a:xfrm>
           <a:prstGeom prst="rect">
             <a:avLst/>
@@ -6338,8 +6338,8 @@
         </p:nvSpPr>
         <p:spPr>
           <a:xfrm>
-            <a:off x="640080" y="7627624"/>
-            <a:ext cx="2987040" cy="438149"/>
+            <a:off x="640080" y="5085083"/>
+            <a:ext cx="2987040" cy="292099"/>
           </a:xfrm>
           <a:prstGeom prst="rect">
             <a:avLst/>
@@ -6368,7 +6368,7 @@
                 </a:solidFill>
               </a:rPr>
               <a:pPr/>
-              <a:t>9/14/22</a:t>
+              <a:t>11/2/22</a:t>
             </a:fld>
             <a:endParaRPr lang="en-IE">
               <a:solidFill>
@@ -6392,8 +6392,8 @@
         </p:nvSpPr>
         <p:spPr>
           <a:xfrm>
-            <a:off x="4373880" y="7627624"/>
-            <a:ext cx="4053840" cy="438149"/>
+            <a:off x="4373880" y="5085083"/>
+            <a:ext cx="4053840" cy="292099"/>
           </a:xfrm>
           <a:prstGeom prst="rect">
             <a:avLst/>
@@ -6435,8 +6435,8 @@
         </p:nvSpPr>
         <p:spPr>
           <a:xfrm>
-            <a:off x="9174480" y="7627624"/>
-            <a:ext cx="2987040" cy="438149"/>
+            <a:off x="9174480" y="5085083"/>
+            <a:ext cx="2987040" cy="292099"/>
           </a:xfrm>
           <a:prstGeom prst="rect">
             <a:avLst/>
@@ -6770,10 +6770,10 @@
       </p:grpSpPr>
       <p:cxnSp>
         <p:nvCxnSpPr>
-          <p:cNvPr id="455" name="Straight Connector 454">
+          <p:cNvPr id="74" name="Straight Connector 73">
             <a:extLst>
               <a:ext uri="{FF2B5EF4-FFF2-40B4-BE49-F238E27FC236}">
-                <a16:creationId xmlns:a16="http://schemas.microsoft.com/office/drawing/2014/main" id="{1B169937-D645-9949-9933-A4D9A0D11A6A}"/>
+                <a16:creationId xmlns:a16="http://schemas.microsoft.com/office/drawing/2014/main" id="{409D096C-BD63-EE40-85F7-12844CBC39C5}"/>
               </a:ext>
             </a:extLst>
           </p:cNvPr>
@@ -6782,7 +6782,7 @@
         </p:nvCxnSpPr>
         <p:spPr>
           <a:xfrm flipV="1">
-            <a:off x="1479202" y="3006561"/>
+            <a:off x="1479202" y="3021476"/>
             <a:ext cx="3600000" cy="4378"/>
           </a:xfrm>
           <a:prstGeom prst="line">
@@ -6811,10 +6811,10 @@
       </p:cxnSp>
       <p:sp>
         <p:nvSpPr>
-          <p:cNvPr id="456" name="Rectangle 455">
+          <p:cNvPr id="75" name="Rectangle 74">
             <a:extLst>
               <a:ext uri="{FF2B5EF4-FFF2-40B4-BE49-F238E27FC236}">
-                <a16:creationId xmlns:a16="http://schemas.microsoft.com/office/drawing/2014/main" id="{40A3715D-70F7-404B-921F-5A0AEB55F87E}"/>
+                <a16:creationId xmlns:a16="http://schemas.microsoft.com/office/drawing/2014/main" id="{08A70148-9355-7244-88EF-61F397A21B28}"/>
               </a:ext>
             </a:extLst>
           </p:cNvPr>
@@ -6823,7 +6823,7 @@
         </p:nvSpPr>
         <p:spPr>
           <a:xfrm>
-            <a:off x="4143497" y="2868016"/>
+            <a:off x="4143497" y="2882931"/>
             <a:ext cx="792000" cy="252000"/>
           </a:xfrm>
           <a:prstGeom prst="rect">
@@ -6869,10 +6869,10 @@
       </p:sp>
       <p:sp>
         <p:nvSpPr>
-          <p:cNvPr id="457" name="TextBox 456">
+          <p:cNvPr id="76" name="TextBox 75">
             <a:extLst>
               <a:ext uri="{FF2B5EF4-FFF2-40B4-BE49-F238E27FC236}">
-                <a16:creationId xmlns:a16="http://schemas.microsoft.com/office/drawing/2014/main" id="{59169198-2993-524E-8050-67CF98267C58}"/>
+                <a16:creationId xmlns:a16="http://schemas.microsoft.com/office/drawing/2014/main" id="{DDE08A49-EA68-7D42-9913-1DB486686279}"/>
               </a:ext>
             </a:extLst>
           </p:cNvPr>
@@ -6881,7 +6881,7 @@
         </p:nvSpPr>
         <p:spPr>
           <a:xfrm>
-            <a:off x="4071491" y="2861278"/>
+            <a:off x="4071491" y="2876193"/>
             <a:ext cx="928695" cy="276999"/>
           </a:xfrm>
           <a:prstGeom prst="rect">
@@ -6911,10 +6911,10 @@
       </p:sp>
       <p:cxnSp>
         <p:nvCxnSpPr>
-          <p:cNvPr id="458" name="Straight Connector 457">
+          <p:cNvPr id="77" name="Straight Connector 76">
             <a:extLst>
               <a:ext uri="{FF2B5EF4-FFF2-40B4-BE49-F238E27FC236}">
-                <a16:creationId xmlns:a16="http://schemas.microsoft.com/office/drawing/2014/main" id="{A4E1D0B1-2764-5D42-90A0-D6AFBD817E94}"/>
+                <a16:creationId xmlns:a16="http://schemas.microsoft.com/office/drawing/2014/main" id="{F7729B20-A5A9-0C4C-A05A-48EFD1D80C06}"/>
               </a:ext>
             </a:extLst>
           </p:cNvPr>
@@ -6923,7 +6923,7 @@
         </p:nvCxnSpPr>
         <p:spPr>
           <a:xfrm flipV="1">
-            <a:off x="975146" y="1665536"/>
+            <a:off x="975146" y="1680451"/>
             <a:ext cx="1872000" cy="4378"/>
           </a:xfrm>
           <a:prstGeom prst="line">
@@ -6952,10 +6952,10 @@
       </p:cxnSp>
       <p:cxnSp>
         <p:nvCxnSpPr>
-          <p:cNvPr id="459" name="Straight Connector 458">
+          <p:cNvPr id="78" name="Straight Connector 77">
             <a:extLst>
               <a:ext uri="{FF2B5EF4-FFF2-40B4-BE49-F238E27FC236}">
-                <a16:creationId xmlns:a16="http://schemas.microsoft.com/office/drawing/2014/main" id="{3ECC446B-AAEB-2349-84AE-749D8E065ADB}"/>
+                <a16:creationId xmlns:a16="http://schemas.microsoft.com/office/drawing/2014/main" id="{50C4ABFA-AD95-C442-9181-F4977FB20CB0}"/>
               </a:ext>
             </a:extLst>
           </p:cNvPr>
@@ -6964,7 +6964,7 @@
         </p:nvCxnSpPr>
         <p:spPr>
           <a:xfrm flipV="1">
-            <a:off x="975146" y="613466"/>
+            <a:off x="975146" y="628381"/>
             <a:ext cx="1116000" cy="4378"/>
           </a:xfrm>
           <a:prstGeom prst="line">
@@ -6993,15 +6993,15 @@
       </p:cxnSp>
       <p:pic>
         <p:nvPicPr>
-          <p:cNvPr id="460" name="Picture 12">
+          <p:cNvPr id="79" name="Picture 14">
             <a:extLst>
               <a:ext uri="{FF2B5EF4-FFF2-40B4-BE49-F238E27FC236}">
-                <a16:creationId xmlns:a16="http://schemas.microsoft.com/office/drawing/2014/main" id="{26DDD54C-0772-2747-A11A-20FA164768C9}"/>
+                <a16:creationId xmlns:a16="http://schemas.microsoft.com/office/drawing/2014/main" id="{069FBC72-E8C3-D047-8E25-9BDCAE21A8E7}"/>
               </a:ext>
             </a:extLst>
           </p:cNvPr>
           <p:cNvPicPr>
-            <a:picLocks noChangeAspect="1" noChangeArrowheads="1"/>
+            <a:picLocks noChangeArrowheads="1"/>
           </p:cNvPicPr>
           <p:nvPr/>
         </p:nvPicPr>
@@ -7011,60 +7011,6 @@
               <a:ext uri="{BEBA8EAE-BF5A-486C-A8C5-ECC9F3942E4B}">
                 <a14:imgProps xmlns:a14="http://schemas.microsoft.com/office/drawing/2010/main">
                   <a14:imgLayer r:embed="rId4">
-                    <a14:imgEffect>
-                      <a14:sharpenSoften amount="30000"/>
-                    </a14:imgEffect>
-                    <a14:imgEffect>
-                      <a14:brightnessContrast bright="2000" contrast="-17000"/>
-                    </a14:imgEffect>
-                  </a14:imgLayer>
-                </a14:imgProps>
-              </a:ext>
-            </a:extLst>
-          </a:blip>
-          <a:srcRect l="2895" t="7579" r="19406" b="20658"/>
-          <a:stretch/>
-        </p:blipFill>
-        <p:spPr bwMode="auto">
-          <a:xfrm>
-            <a:off x="6639141" y="5944562"/>
-            <a:ext cx="3564536" cy="2050617"/>
-          </a:xfrm>
-          <a:prstGeom prst="rect">
-            <a:avLst/>
-          </a:prstGeom>
-          <a:noFill/>
-          <a:ln w="9525">
-            <a:solidFill>
-              <a:schemeClr val="tx1"/>
-            </a:solidFill>
-            <a:miter lim="800000"/>
-            <a:headEnd/>
-            <a:tailEnd/>
-          </a:ln>
-          <a:effectLst/>
-        </p:spPr>
-      </p:pic>
-      <p:pic>
-        <p:nvPicPr>
-          <p:cNvPr id="461" name="Picture 14">
-            <a:extLst>
-              <a:ext uri="{FF2B5EF4-FFF2-40B4-BE49-F238E27FC236}">
-                <a16:creationId xmlns:a16="http://schemas.microsoft.com/office/drawing/2014/main" id="{5BC55CA0-D718-8249-9E36-10884361BAA5}"/>
-              </a:ext>
-            </a:extLst>
-          </p:cNvPr>
-          <p:cNvPicPr>
-            <a:picLocks noChangeArrowheads="1"/>
-          </p:cNvPicPr>
-          <p:nvPr/>
-        </p:nvPicPr>
-        <p:blipFill rotWithShape="1">
-          <a:blip r:embed="rId5" cstate="print">
-            <a:extLst>
-              <a:ext uri="{BEBA8EAE-BF5A-486C-A8C5-ECC9F3942E4B}">
-                <a14:imgProps xmlns:a14="http://schemas.microsoft.com/office/drawing/2010/main">
-                  <a14:imgLayer r:embed="rId6">
                     <a14:imgEffect>
                       <a14:brightnessContrast bright="-18000" contrast="20000"/>
                     </a14:imgEffect>
@@ -7098,10 +7044,10 @@
       </p:pic>
       <p:sp>
         <p:nvSpPr>
-          <p:cNvPr id="462" name="TextBox 461">
+          <p:cNvPr id="80" name="TextBox 79">
             <a:extLst>
               <a:ext uri="{FF2B5EF4-FFF2-40B4-BE49-F238E27FC236}">
-                <a16:creationId xmlns:a16="http://schemas.microsoft.com/office/drawing/2014/main" id="{194C2D98-29A8-DB49-9DD3-E27C720E933D}"/>
+                <a16:creationId xmlns:a16="http://schemas.microsoft.com/office/drawing/2014/main" id="{7D54589A-B1F3-9F43-AC2D-9C91D5D67776}"/>
               </a:ext>
             </a:extLst>
           </p:cNvPr>
@@ -7109,9 +7055,9 @@
           <p:nvPr/>
         </p:nvSpPr>
         <p:spPr>
-          <a:xfrm>
-            <a:off x="6099221" y="6371719"/>
-            <a:ext cx="2523350" cy="230832"/>
+          <a:xfrm rot="18055418">
+            <a:off x="6252884" y="813979"/>
+            <a:ext cx="1550364" cy="261610"/>
           </a:xfrm>
           <a:prstGeom prst="rect">
             <a:avLst/>
@@ -7125,21 +7071,21 @@
           <a:lstStyle/>
           <a:p>
             <a:r>
-              <a:rPr lang="en-GB" sz="900" b="1" dirty="0">
+              <a:rPr lang="en-GB" sz="1100" b="1" dirty="0">
                 <a:latin typeface="Calibri" panose="020F0502020204030204" pitchFamily="34" charset="0"/>
                 <a:cs typeface="Calibri" panose="020F0502020204030204" pitchFamily="34" charset="0"/>
               </a:rPr>
-              <a:t> 100kDa</a:t>
-            </a:r>
-          </a:p>
-        </p:txBody>
-      </p:sp>
-      <p:sp>
-        <p:nvSpPr>
-          <p:cNvPr id="463" name="TextBox 462">
+              <a:t>M</a:t>
+            </a:r>
+          </a:p>
+        </p:txBody>
+      </p:sp>
+      <p:sp>
+        <p:nvSpPr>
+          <p:cNvPr id="81" name="TextBox 80">
             <a:extLst>
               <a:ext uri="{FF2B5EF4-FFF2-40B4-BE49-F238E27FC236}">
-                <a16:creationId xmlns:a16="http://schemas.microsoft.com/office/drawing/2014/main" id="{8EECC82E-2303-A141-89A7-F72E0BBE9ABA}"/>
+                <a16:creationId xmlns:a16="http://schemas.microsoft.com/office/drawing/2014/main" id="{E35381B7-7CBB-C849-87E7-45455916C476}"/>
               </a:ext>
             </a:extLst>
           </p:cNvPr>
@@ -7147,9 +7093,9 @@
           <p:nvPr/>
         </p:nvSpPr>
         <p:spPr>
-          <a:xfrm>
-            <a:off x="6099221" y="5954479"/>
-            <a:ext cx="2523350" cy="230832"/>
+          <a:xfrm rot="18055418">
+            <a:off x="6570850" y="866819"/>
+            <a:ext cx="1427174" cy="261610"/>
           </a:xfrm>
           <a:prstGeom prst="rect">
             <a:avLst/>
@@ -7163,21 +7109,21 @@
           <a:lstStyle/>
           <a:p>
             <a:r>
-              <a:rPr lang="en-GB" sz="900" b="1" dirty="0">
+              <a:rPr lang="en-GB" sz="1100" b="1" dirty="0">
                 <a:latin typeface="Calibri" panose="020F0502020204030204" pitchFamily="34" charset="0"/>
                 <a:cs typeface="Calibri" panose="020F0502020204030204" pitchFamily="34" charset="0"/>
               </a:rPr>
-              <a:t> 250kDa</a:t>
-            </a:r>
-          </a:p>
-        </p:txBody>
-      </p:sp>
-      <p:sp>
-        <p:nvSpPr>
-          <p:cNvPr id="464" name="TextBox 463">
+              <a:t>Pellet following lysis</a:t>
+            </a:r>
+          </a:p>
+        </p:txBody>
+      </p:sp>
+      <p:sp>
+        <p:nvSpPr>
+          <p:cNvPr id="82" name="TextBox 81">
             <a:extLst>
               <a:ext uri="{FF2B5EF4-FFF2-40B4-BE49-F238E27FC236}">
-                <a16:creationId xmlns:a16="http://schemas.microsoft.com/office/drawing/2014/main" id="{013AC799-822C-5044-8A46-CBFE36BA0B08}"/>
+                <a16:creationId xmlns:a16="http://schemas.microsoft.com/office/drawing/2014/main" id="{71E2E0D0-0AA0-A04C-A3E7-A5365BFF939D}"/>
               </a:ext>
             </a:extLst>
           </p:cNvPr>
@@ -7185,9 +7131,9 @@
           <p:nvPr/>
         </p:nvSpPr>
         <p:spPr>
-          <a:xfrm>
-            <a:off x="6099221" y="6155695"/>
-            <a:ext cx="2523350" cy="230832"/>
+          <a:xfrm rot="18055418">
+            <a:off x="6818729" y="923021"/>
+            <a:ext cx="1296144" cy="261610"/>
           </a:xfrm>
           <a:prstGeom prst="rect">
             <a:avLst/>
@@ -7201,21 +7147,21 @@
           <a:lstStyle/>
           <a:p>
             <a:r>
-              <a:rPr lang="en-GB" sz="900" b="1" dirty="0">
+              <a:rPr lang="en-GB" sz="1100" b="1" dirty="0">
                 <a:latin typeface="Calibri" panose="020F0502020204030204" pitchFamily="34" charset="0"/>
                 <a:cs typeface="Calibri" panose="020F0502020204030204" pitchFamily="34" charset="0"/>
               </a:rPr>
-              <a:t> 150kDa</a:t>
-            </a:r>
-          </a:p>
-        </p:txBody>
-      </p:sp>
-      <p:sp>
-        <p:nvSpPr>
-          <p:cNvPr id="465" name="TextBox 464">
+              <a:t>Pre-lysis sample</a:t>
+            </a:r>
+          </a:p>
+        </p:txBody>
+      </p:sp>
+      <p:sp>
+        <p:nvSpPr>
+          <p:cNvPr id="83" name="TextBox 82">
             <a:extLst>
               <a:ext uri="{FF2B5EF4-FFF2-40B4-BE49-F238E27FC236}">
-                <a16:creationId xmlns:a16="http://schemas.microsoft.com/office/drawing/2014/main" id="{5D9AD3A8-0FD0-7F48-9187-FDB021892313}"/>
+                <a16:creationId xmlns:a16="http://schemas.microsoft.com/office/drawing/2014/main" id="{4E6555FB-D6AD-8842-9A1B-C58087AD6BCA}"/>
               </a:ext>
             </a:extLst>
           </p:cNvPr>
@@ -7223,9 +7169,9 @@
           <p:nvPr/>
         </p:nvSpPr>
         <p:spPr>
-          <a:xfrm>
-            <a:off x="6098645" y="6587743"/>
-            <a:ext cx="2523350" cy="230832"/>
+          <a:xfrm rot="18055418">
+            <a:off x="7027948" y="715151"/>
+            <a:ext cx="1780773" cy="261610"/>
           </a:xfrm>
           <a:prstGeom prst="rect">
             <a:avLst/>
@@ -7239,21 +7185,21 @@
           <a:lstStyle/>
           <a:p>
             <a:r>
-              <a:rPr lang="en-GB" sz="900" b="1" dirty="0">
+              <a:rPr lang="en-GB" sz="1100" b="1" dirty="0">
                 <a:latin typeface="Calibri" panose="020F0502020204030204" pitchFamily="34" charset="0"/>
                 <a:cs typeface="Calibri" panose="020F0502020204030204" pitchFamily="34" charset="0"/>
               </a:rPr>
-              <a:t>   75kDa</a:t>
-            </a:r>
-          </a:p>
-        </p:txBody>
-      </p:sp>
-      <p:sp>
-        <p:nvSpPr>
-          <p:cNvPr id="466" name="TextBox 465">
+              <a:t>GFP beads - FT</a:t>
+            </a:r>
+          </a:p>
+        </p:txBody>
+      </p:sp>
+      <p:sp>
+        <p:nvSpPr>
+          <p:cNvPr id="84" name="TextBox 83">
             <a:extLst>
               <a:ext uri="{FF2B5EF4-FFF2-40B4-BE49-F238E27FC236}">
-                <a16:creationId xmlns:a16="http://schemas.microsoft.com/office/drawing/2014/main" id="{5AC5FD4A-BA85-044C-B065-FBDF195C3537}"/>
+                <a16:creationId xmlns:a16="http://schemas.microsoft.com/office/drawing/2014/main" id="{145AB62E-64B4-A54A-932F-0BE8DF5EBEAD}"/>
               </a:ext>
             </a:extLst>
           </p:cNvPr>
@@ -7261,9 +7207,9 @@
           <p:nvPr/>
         </p:nvSpPr>
         <p:spPr>
-          <a:xfrm>
-            <a:off x="6098645" y="6965943"/>
-            <a:ext cx="2523350" cy="230832"/>
+          <a:xfrm rot="18055418">
+            <a:off x="7820036" y="715151"/>
+            <a:ext cx="1780773" cy="261610"/>
           </a:xfrm>
           <a:prstGeom prst="rect">
             <a:avLst/>
@@ -7277,21 +7223,21 @@
           <a:lstStyle/>
           <a:p>
             <a:r>
-              <a:rPr lang="en-GB" sz="900" b="1" dirty="0">
+              <a:rPr lang="en-GB" sz="1100" b="1" dirty="0">
                 <a:latin typeface="Calibri" panose="020F0502020204030204" pitchFamily="34" charset="0"/>
                 <a:cs typeface="Calibri" panose="020F0502020204030204" pitchFamily="34" charset="0"/>
               </a:rPr>
-              <a:t>   50kDa</a:t>
-            </a:r>
-          </a:p>
-        </p:txBody>
-      </p:sp>
-      <p:sp>
-        <p:nvSpPr>
-          <p:cNvPr id="467" name="TextBox 466">
+              <a:t>GFP beads</a:t>
+            </a:r>
+          </a:p>
+        </p:txBody>
+      </p:sp>
+      <p:sp>
+        <p:nvSpPr>
+          <p:cNvPr id="85" name="TextBox 84">
             <a:extLst>
               <a:ext uri="{FF2B5EF4-FFF2-40B4-BE49-F238E27FC236}">
-                <a16:creationId xmlns:a16="http://schemas.microsoft.com/office/drawing/2014/main" id="{DA43F0C9-96E2-5748-9399-337A9A2BE42E}"/>
+                <a16:creationId xmlns:a16="http://schemas.microsoft.com/office/drawing/2014/main" id="{1885887B-735B-454B-AA78-7EAD78810F10}"/>
               </a:ext>
             </a:extLst>
           </p:cNvPr>
@@ -7299,9 +7245,9 @@
           <p:nvPr/>
         </p:nvSpPr>
         <p:spPr>
-          <a:xfrm>
-            <a:off x="6098645" y="7367794"/>
-            <a:ext cx="2523350" cy="230832"/>
+          <a:xfrm rot="18055418">
+            <a:off x="8933187" y="715151"/>
+            <a:ext cx="1780773" cy="261610"/>
           </a:xfrm>
           <a:prstGeom prst="rect">
             <a:avLst/>
@@ -7315,21 +7261,21 @@
           <a:lstStyle/>
           <a:p>
             <a:r>
-              <a:rPr lang="en-GB" sz="900" b="1" dirty="0">
+              <a:rPr lang="en-GB" sz="1100" b="1" dirty="0">
                 <a:latin typeface="Calibri" panose="020F0502020204030204" pitchFamily="34" charset="0"/>
                 <a:cs typeface="Calibri" panose="020F0502020204030204" pitchFamily="34" charset="0"/>
               </a:rPr>
-              <a:t>   37kDa</a:t>
-            </a:r>
-          </a:p>
-        </p:txBody>
-      </p:sp>
-      <p:sp>
-        <p:nvSpPr>
-          <p:cNvPr id="468" name="TextBox 467">
+              <a:t>SNAP  beads</a:t>
+            </a:r>
+          </a:p>
+        </p:txBody>
+      </p:sp>
+      <p:sp>
+        <p:nvSpPr>
+          <p:cNvPr id="86" name="TextBox 85">
             <a:extLst>
               <a:ext uri="{FF2B5EF4-FFF2-40B4-BE49-F238E27FC236}">
-                <a16:creationId xmlns:a16="http://schemas.microsoft.com/office/drawing/2014/main" id="{E545EAF9-E393-FD4F-8B85-2DC0E054E1F6}"/>
+                <a16:creationId xmlns:a16="http://schemas.microsoft.com/office/drawing/2014/main" id="{44019B8E-0F1B-BD4A-AF6E-CF864369459D}"/>
               </a:ext>
             </a:extLst>
           </p:cNvPr>
@@ -7337,9 +7283,9 @@
           <p:nvPr/>
         </p:nvSpPr>
         <p:spPr>
-          <a:xfrm>
-            <a:off x="6098645" y="7758031"/>
-            <a:ext cx="2523350" cy="230832"/>
+          <a:xfrm rot="18055418">
+            <a:off x="9476220" y="715151"/>
+            <a:ext cx="1780773" cy="261610"/>
           </a:xfrm>
           <a:prstGeom prst="rect">
             <a:avLst/>
@@ -7353,21 +7299,21 @@
           <a:lstStyle/>
           <a:p>
             <a:r>
-              <a:rPr lang="en-GB" sz="900" b="1" dirty="0">
+              <a:rPr lang="en-GB" sz="1100" b="1" dirty="0">
                 <a:latin typeface="Calibri" panose="020F0502020204030204" pitchFamily="34" charset="0"/>
                 <a:cs typeface="Calibri" panose="020F0502020204030204" pitchFamily="34" charset="0"/>
               </a:rPr>
-              <a:t>   25kDa</a:t>
-            </a:r>
-          </a:p>
-        </p:txBody>
-      </p:sp>
-      <p:sp>
-        <p:nvSpPr>
-          <p:cNvPr id="469" name="TextBox 468">
+              <a:t>Pure Lysate  </a:t>
+            </a:r>
+          </a:p>
+        </p:txBody>
+      </p:sp>
+      <p:sp>
+        <p:nvSpPr>
+          <p:cNvPr id="87" name="TextBox 86">
             <a:extLst>
               <a:ext uri="{FF2B5EF4-FFF2-40B4-BE49-F238E27FC236}">
-                <a16:creationId xmlns:a16="http://schemas.microsoft.com/office/drawing/2014/main" id="{27543194-7A85-EF45-8B03-AA9FE522CD80}"/>
+                <a16:creationId xmlns:a16="http://schemas.microsoft.com/office/drawing/2014/main" id="{3D28FCA5-BE9B-844F-84C1-FBB5ECA3A62F}"/>
               </a:ext>
             </a:extLst>
           </p:cNvPr>
@@ -7376,8 +7322,8 @@
         </p:nvSpPr>
         <p:spPr>
           <a:xfrm rot="18055418">
-            <a:off x="6252884" y="813979"/>
-            <a:ext cx="1550364" cy="261610"/>
+            <a:off x="8357123" y="715151"/>
+            <a:ext cx="1780773" cy="261610"/>
           </a:xfrm>
           <a:prstGeom prst="rect">
             <a:avLst/>
@@ -7395,17 +7341,17 @@
                 <a:latin typeface="Calibri" panose="020F0502020204030204" pitchFamily="34" charset="0"/>
                 <a:cs typeface="Calibri" panose="020F0502020204030204" pitchFamily="34" charset="0"/>
               </a:rPr>
-              <a:t>M</a:t>
-            </a:r>
-          </a:p>
-        </p:txBody>
-      </p:sp>
-      <p:sp>
-        <p:nvSpPr>
-          <p:cNvPr id="470" name="TextBox 469">
+              <a:t>SNAP beads - FT </a:t>
+            </a:r>
+          </a:p>
+        </p:txBody>
+      </p:sp>
+      <p:sp>
+        <p:nvSpPr>
+          <p:cNvPr id="88" name="TextBox 87">
             <a:extLst>
               <a:ext uri="{FF2B5EF4-FFF2-40B4-BE49-F238E27FC236}">
-                <a16:creationId xmlns:a16="http://schemas.microsoft.com/office/drawing/2014/main" id="{1E28B413-3BFC-1941-A17A-896F73135CB9}"/>
+                <a16:creationId xmlns:a16="http://schemas.microsoft.com/office/drawing/2014/main" id="{B50B8071-1888-7C4A-9AB9-FB577E57EAF8}"/>
               </a:ext>
             </a:extLst>
           </p:cNvPr>
@@ -7413,9 +7359,9 @@
           <p:nvPr/>
         </p:nvSpPr>
         <p:spPr>
-          <a:xfrm rot="18055418">
-            <a:off x="6570850" y="866819"/>
-            <a:ext cx="1427174" cy="261610"/>
+          <a:xfrm>
+            <a:off x="6120741" y="2195255"/>
+            <a:ext cx="2523350" cy="230832"/>
           </a:xfrm>
           <a:prstGeom prst="rect">
             <a:avLst/>
@@ -7429,21 +7375,21 @@
           <a:lstStyle/>
           <a:p>
             <a:r>
-              <a:rPr lang="en-GB" sz="1100" b="1" dirty="0">
+              <a:rPr lang="en-GB" sz="900" b="1" dirty="0">
                 <a:latin typeface="Calibri" panose="020F0502020204030204" pitchFamily="34" charset="0"/>
                 <a:cs typeface="Calibri" panose="020F0502020204030204" pitchFamily="34" charset="0"/>
               </a:rPr>
-              <a:t>Pellet following lysis</a:t>
-            </a:r>
-          </a:p>
-        </p:txBody>
-      </p:sp>
-      <p:sp>
-        <p:nvSpPr>
-          <p:cNvPr id="471" name="TextBox 470">
+              <a:t>  75kDa</a:t>
+            </a:r>
+          </a:p>
+        </p:txBody>
+      </p:sp>
+      <p:sp>
+        <p:nvSpPr>
+          <p:cNvPr id="89" name="TextBox 88">
             <a:extLst>
               <a:ext uri="{FF2B5EF4-FFF2-40B4-BE49-F238E27FC236}">
-                <a16:creationId xmlns:a16="http://schemas.microsoft.com/office/drawing/2014/main" id="{2C23CE7E-1FDD-F941-9DA3-ECF8BD264A03}"/>
+                <a16:creationId xmlns:a16="http://schemas.microsoft.com/office/drawing/2014/main" id="{54080E07-06F5-E945-9F9E-F2B429DC0026}"/>
               </a:ext>
             </a:extLst>
           </p:cNvPr>
@@ -7451,272 +7397,6 @@
           <p:nvPr/>
         </p:nvSpPr>
         <p:spPr>
-          <a:xfrm rot="18055418">
-            <a:off x="6818729" y="923021"/>
-            <a:ext cx="1296144" cy="261610"/>
-          </a:xfrm>
-          <a:prstGeom prst="rect">
-            <a:avLst/>
-          </a:prstGeom>
-          <a:noFill/>
-        </p:spPr>
-        <p:txBody>
-          <a:bodyPr wrap="square" rtlCol="0">
-            <a:spAutoFit/>
-          </a:bodyPr>
-          <a:lstStyle/>
-          <a:p>
-            <a:r>
-              <a:rPr lang="en-GB" sz="1100" b="1" dirty="0">
-                <a:latin typeface="Calibri" panose="020F0502020204030204" pitchFamily="34" charset="0"/>
-                <a:cs typeface="Calibri" panose="020F0502020204030204" pitchFamily="34" charset="0"/>
-              </a:rPr>
-              <a:t>Pre-lysis sample</a:t>
-            </a:r>
-          </a:p>
-        </p:txBody>
-      </p:sp>
-      <p:sp>
-        <p:nvSpPr>
-          <p:cNvPr id="472" name="TextBox 471">
-            <a:extLst>
-              <a:ext uri="{FF2B5EF4-FFF2-40B4-BE49-F238E27FC236}">
-                <a16:creationId xmlns:a16="http://schemas.microsoft.com/office/drawing/2014/main" id="{E16E9D01-D483-3342-A004-3F35A31304B0}"/>
-              </a:ext>
-            </a:extLst>
-          </p:cNvPr>
-          <p:cNvSpPr txBox="1"/>
-          <p:nvPr/>
-        </p:nvSpPr>
-        <p:spPr>
-          <a:xfrm rot="18055418">
-            <a:off x="7027948" y="715151"/>
-            <a:ext cx="1780773" cy="261610"/>
-          </a:xfrm>
-          <a:prstGeom prst="rect">
-            <a:avLst/>
-          </a:prstGeom>
-          <a:noFill/>
-        </p:spPr>
-        <p:txBody>
-          <a:bodyPr wrap="square" rtlCol="0">
-            <a:spAutoFit/>
-          </a:bodyPr>
-          <a:lstStyle/>
-          <a:p>
-            <a:r>
-              <a:rPr lang="en-GB" sz="1100" b="1" dirty="0">
-                <a:latin typeface="Calibri" panose="020F0502020204030204" pitchFamily="34" charset="0"/>
-                <a:cs typeface="Calibri" panose="020F0502020204030204" pitchFamily="34" charset="0"/>
-              </a:rPr>
-              <a:t>GFP beads - FT</a:t>
-            </a:r>
-          </a:p>
-        </p:txBody>
-      </p:sp>
-      <p:sp>
-        <p:nvSpPr>
-          <p:cNvPr id="473" name="TextBox 472">
-            <a:extLst>
-              <a:ext uri="{FF2B5EF4-FFF2-40B4-BE49-F238E27FC236}">
-                <a16:creationId xmlns:a16="http://schemas.microsoft.com/office/drawing/2014/main" id="{19285BF6-D2DC-784A-A408-50D8BFF9FC26}"/>
-              </a:ext>
-            </a:extLst>
-          </p:cNvPr>
-          <p:cNvSpPr txBox="1"/>
-          <p:nvPr/>
-        </p:nvSpPr>
-        <p:spPr>
-          <a:xfrm rot="18055418">
-            <a:off x="7820036" y="715151"/>
-            <a:ext cx="1780773" cy="261610"/>
-          </a:xfrm>
-          <a:prstGeom prst="rect">
-            <a:avLst/>
-          </a:prstGeom>
-          <a:noFill/>
-        </p:spPr>
-        <p:txBody>
-          <a:bodyPr wrap="square" rtlCol="0">
-            <a:spAutoFit/>
-          </a:bodyPr>
-          <a:lstStyle/>
-          <a:p>
-            <a:r>
-              <a:rPr lang="en-GB" sz="1100" b="1" dirty="0">
-                <a:latin typeface="Calibri" panose="020F0502020204030204" pitchFamily="34" charset="0"/>
-                <a:cs typeface="Calibri" panose="020F0502020204030204" pitchFamily="34" charset="0"/>
-              </a:rPr>
-              <a:t>GFP beads</a:t>
-            </a:r>
-          </a:p>
-        </p:txBody>
-      </p:sp>
-      <p:sp>
-        <p:nvSpPr>
-          <p:cNvPr id="474" name="TextBox 473">
-            <a:extLst>
-              <a:ext uri="{FF2B5EF4-FFF2-40B4-BE49-F238E27FC236}">
-                <a16:creationId xmlns:a16="http://schemas.microsoft.com/office/drawing/2014/main" id="{8FDD28D3-2AC4-BE41-98A7-13B0ED82BD84}"/>
-              </a:ext>
-            </a:extLst>
-          </p:cNvPr>
-          <p:cNvSpPr txBox="1"/>
-          <p:nvPr/>
-        </p:nvSpPr>
-        <p:spPr>
-          <a:xfrm rot="18055418">
-            <a:off x="8933187" y="715151"/>
-            <a:ext cx="1780773" cy="261610"/>
-          </a:xfrm>
-          <a:prstGeom prst="rect">
-            <a:avLst/>
-          </a:prstGeom>
-          <a:noFill/>
-        </p:spPr>
-        <p:txBody>
-          <a:bodyPr wrap="square" rtlCol="0">
-            <a:spAutoFit/>
-          </a:bodyPr>
-          <a:lstStyle/>
-          <a:p>
-            <a:r>
-              <a:rPr lang="en-GB" sz="1100" b="1" dirty="0">
-                <a:latin typeface="Calibri" panose="020F0502020204030204" pitchFamily="34" charset="0"/>
-                <a:cs typeface="Calibri" panose="020F0502020204030204" pitchFamily="34" charset="0"/>
-              </a:rPr>
-              <a:t>SNAP  beads</a:t>
-            </a:r>
-          </a:p>
-        </p:txBody>
-      </p:sp>
-      <p:sp>
-        <p:nvSpPr>
-          <p:cNvPr id="475" name="TextBox 474">
-            <a:extLst>
-              <a:ext uri="{FF2B5EF4-FFF2-40B4-BE49-F238E27FC236}">
-                <a16:creationId xmlns:a16="http://schemas.microsoft.com/office/drawing/2014/main" id="{E88AF760-24AC-7C47-9F32-35BF6F57A634}"/>
-              </a:ext>
-            </a:extLst>
-          </p:cNvPr>
-          <p:cNvSpPr txBox="1"/>
-          <p:nvPr/>
-        </p:nvSpPr>
-        <p:spPr>
-          <a:xfrm rot="18055418">
-            <a:off x="9476220" y="715151"/>
-            <a:ext cx="1780773" cy="261610"/>
-          </a:xfrm>
-          <a:prstGeom prst="rect">
-            <a:avLst/>
-          </a:prstGeom>
-          <a:noFill/>
-        </p:spPr>
-        <p:txBody>
-          <a:bodyPr wrap="square" rtlCol="0">
-            <a:spAutoFit/>
-          </a:bodyPr>
-          <a:lstStyle/>
-          <a:p>
-            <a:r>
-              <a:rPr lang="en-GB" sz="1100" b="1" dirty="0">
-                <a:latin typeface="Calibri" panose="020F0502020204030204" pitchFamily="34" charset="0"/>
-                <a:cs typeface="Calibri" panose="020F0502020204030204" pitchFamily="34" charset="0"/>
-              </a:rPr>
-              <a:t>Pure Lysate  </a:t>
-            </a:r>
-          </a:p>
-        </p:txBody>
-      </p:sp>
-      <p:sp>
-        <p:nvSpPr>
-          <p:cNvPr id="476" name="TextBox 475">
-            <a:extLst>
-              <a:ext uri="{FF2B5EF4-FFF2-40B4-BE49-F238E27FC236}">
-                <a16:creationId xmlns:a16="http://schemas.microsoft.com/office/drawing/2014/main" id="{6FD23658-807B-6340-A319-18FD7B8E3DB2}"/>
-              </a:ext>
-            </a:extLst>
-          </p:cNvPr>
-          <p:cNvSpPr txBox="1"/>
-          <p:nvPr/>
-        </p:nvSpPr>
-        <p:spPr>
-          <a:xfrm rot="18055418">
-            <a:off x="8357123" y="715151"/>
-            <a:ext cx="1780773" cy="261610"/>
-          </a:xfrm>
-          <a:prstGeom prst="rect">
-            <a:avLst/>
-          </a:prstGeom>
-          <a:noFill/>
-        </p:spPr>
-        <p:txBody>
-          <a:bodyPr wrap="square" rtlCol="0">
-            <a:spAutoFit/>
-          </a:bodyPr>
-          <a:lstStyle/>
-          <a:p>
-            <a:r>
-              <a:rPr lang="en-GB" sz="1100" b="1" dirty="0">
-                <a:latin typeface="Calibri" panose="020F0502020204030204" pitchFamily="34" charset="0"/>
-                <a:cs typeface="Calibri" panose="020F0502020204030204" pitchFamily="34" charset="0"/>
-              </a:rPr>
-              <a:t>SNAP beads - FT </a:t>
-            </a:r>
-          </a:p>
-        </p:txBody>
-      </p:sp>
-      <p:sp>
-        <p:nvSpPr>
-          <p:cNvPr id="477" name="TextBox 476">
-            <a:extLst>
-              <a:ext uri="{FF2B5EF4-FFF2-40B4-BE49-F238E27FC236}">
-                <a16:creationId xmlns:a16="http://schemas.microsoft.com/office/drawing/2014/main" id="{CAF45B9B-8639-2040-85A5-41942653AD0A}"/>
-              </a:ext>
-            </a:extLst>
-          </p:cNvPr>
-          <p:cNvSpPr txBox="1"/>
-          <p:nvPr/>
-        </p:nvSpPr>
-        <p:spPr>
-          <a:xfrm>
-            <a:off x="6120741" y="2195255"/>
-            <a:ext cx="2523350" cy="230832"/>
-          </a:xfrm>
-          <a:prstGeom prst="rect">
-            <a:avLst/>
-          </a:prstGeom>
-          <a:noFill/>
-        </p:spPr>
-        <p:txBody>
-          <a:bodyPr wrap="square" rtlCol="0">
-            <a:spAutoFit/>
-          </a:bodyPr>
-          <a:lstStyle/>
-          <a:p>
-            <a:r>
-              <a:rPr lang="en-GB" sz="900" b="1" dirty="0">
-                <a:latin typeface="Calibri" panose="020F0502020204030204" pitchFamily="34" charset="0"/>
-                <a:cs typeface="Calibri" panose="020F0502020204030204" pitchFamily="34" charset="0"/>
-              </a:rPr>
-              <a:t>  75kDa</a:t>
-            </a:r>
-          </a:p>
-        </p:txBody>
-      </p:sp>
-      <p:sp>
-        <p:nvSpPr>
-          <p:cNvPr id="478" name="TextBox 477">
-            <a:extLst>
-              <a:ext uri="{FF2B5EF4-FFF2-40B4-BE49-F238E27FC236}">
-                <a16:creationId xmlns:a16="http://schemas.microsoft.com/office/drawing/2014/main" id="{E8EE774C-DBBE-B046-A577-B1CADE9B3A99}"/>
-              </a:ext>
-            </a:extLst>
-          </p:cNvPr>
-          <p:cNvSpPr txBox="1"/>
-          <p:nvPr/>
-        </p:nvSpPr>
-        <p:spPr>
           <a:xfrm>
             <a:off x="6120741" y="3434199"/>
             <a:ext cx="2523350" cy="230832"/>
@@ -7744,10 +7424,10 @@
       </p:sp>
       <p:sp>
         <p:nvSpPr>
-          <p:cNvPr id="479" name="Rectangle 478">
+          <p:cNvPr id="90" name="Rectangle 89">
             <a:extLst>
               <a:ext uri="{FF2B5EF4-FFF2-40B4-BE49-F238E27FC236}">
-                <a16:creationId xmlns:a16="http://schemas.microsoft.com/office/drawing/2014/main" id="{5B264F9B-FA32-EA43-9378-20F9FE15A04F}"/>
+                <a16:creationId xmlns:a16="http://schemas.microsoft.com/office/drawing/2014/main" id="{FD7F20FE-137D-B245-B9D3-47C9B25AB1DE}"/>
               </a:ext>
             </a:extLst>
           </p:cNvPr>
@@ -7756,7 +7436,7 @@
         </p:nvSpPr>
         <p:spPr>
           <a:xfrm>
-            <a:off x="2836526" y="2868016"/>
+            <a:off x="2836526" y="2882931"/>
             <a:ext cx="1326461" cy="252000"/>
           </a:xfrm>
           <a:prstGeom prst="rect">
@@ -7802,10 +7482,10 @@
       </p:sp>
       <p:sp>
         <p:nvSpPr>
-          <p:cNvPr id="480" name="TextBox 479">
+          <p:cNvPr id="91" name="TextBox 90">
             <a:extLst>
               <a:ext uri="{FF2B5EF4-FFF2-40B4-BE49-F238E27FC236}">
-                <a16:creationId xmlns:a16="http://schemas.microsoft.com/office/drawing/2014/main" id="{B9655427-2BD4-F843-A5C8-6BF478051ACB}"/>
+                <a16:creationId xmlns:a16="http://schemas.microsoft.com/office/drawing/2014/main" id="{13F75E79-538B-8440-88C7-3469D94B9F28}"/>
               </a:ext>
             </a:extLst>
           </p:cNvPr>
@@ -7814,7 +7494,7 @@
         </p:nvSpPr>
         <p:spPr>
           <a:xfrm>
-            <a:off x="3358820" y="2860607"/>
+            <a:off x="3358820" y="2875522"/>
             <a:ext cx="928695" cy="276999"/>
           </a:xfrm>
           <a:prstGeom prst="rect">
@@ -7844,10 +7524,10 @@
       </p:sp>
       <p:sp>
         <p:nvSpPr>
-          <p:cNvPr id="481" name="Rectangle 480">
+          <p:cNvPr id="92" name="Rectangle 91">
             <a:extLst>
               <a:ext uri="{FF2B5EF4-FFF2-40B4-BE49-F238E27FC236}">
-                <a16:creationId xmlns:a16="http://schemas.microsoft.com/office/drawing/2014/main" id="{1D8592AA-ECB8-C640-B68D-7674423D9B00}"/>
+                <a16:creationId xmlns:a16="http://schemas.microsoft.com/office/drawing/2014/main" id="{4C5939BA-F33E-0742-A7F2-80E7B077A1D2}"/>
               </a:ext>
             </a:extLst>
           </p:cNvPr>
@@ -7856,7 +7536,7 @@
         </p:nvSpPr>
         <p:spPr>
           <a:xfrm>
-            <a:off x="1479203" y="2868016"/>
+            <a:off x="1479203" y="2882931"/>
             <a:ext cx="500067" cy="252000"/>
           </a:xfrm>
           <a:prstGeom prst="rect">
@@ -7899,10 +7579,10 @@
       </p:sp>
       <p:sp>
         <p:nvSpPr>
-          <p:cNvPr id="482" name="TextBox 481">
+          <p:cNvPr id="93" name="TextBox 92">
             <a:extLst>
               <a:ext uri="{FF2B5EF4-FFF2-40B4-BE49-F238E27FC236}">
-                <a16:creationId xmlns:a16="http://schemas.microsoft.com/office/drawing/2014/main" id="{4E4FC21D-A503-1D4E-9CFF-CC6F388862A4}"/>
+                <a16:creationId xmlns:a16="http://schemas.microsoft.com/office/drawing/2014/main" id="{67597D09-D425-1842-8DD8-E70D2F099726}"/>
               </a:ext>
             </a:extLst>
           </p:cNvPr>
@@ -7911,7 +7591,7 @@
         </p:nvSpPr>
         <p:spPr>
           <a:xfrm>
-            <a:off x="336765" y="2862713"/>
+            <a:off x="336765" y="2877628"/>
             <a:ext cx="1214447" cy="276999"/>
           </a:xfrm>
           <a:prstGeom prst="rect">
@@ -7948,10 +7628,10 @@
       </p:sp>
       <p:sp>
         <p:nvSpPr>
-          <p:cNvPr id="483" name="TextBox 482">
+          <p:cNvPr id="94" name="TextBox 93">
             <a:extLst>
               <a:ext uri="{FF2B5EF4-FFF2-40B4-BE49-F238E27FC236}">
-                <a16:creationId xmlns:a16="http://schemas.microsoft.com/office/drawing/2014/main" id="{E6D85BB0-F6F9-A04E-9CAF-45731F2D4882}"/>
+                <a16:creationId xmlns:a16="http://schemas.microsoft.com/office/drawing/2014/main" id="{E68A9504-B065-DC44-97D0-68B141E1BEBA}"/>
               </a:ext>
             </a:extLst>
           </p:cNvPr>
@@ -7960,7 +7640,7 @@
         </p:nvSpPr>
         <p:spPr>
           <a:xfrm>
-            <a:off x="1479204" y="3111418"/>
+            <a:off x="1479204" y="3126333"/>
             <a:ext cx="928695" cy="253916"/>
           </a:xfrm>
           <a:prstGeom prst="rect">
@@ -7990,10 +7670,10 @@
       </p:sp>
       <p:sp>
         <p:nvSpPr>
-          <p:cNvPr id="484" name="TextBox 483">
+          <p:cNvPr id="95" name="TextBox 94">
             <a:extLst>
               <a:ext uri="{FF2B5EF4-FFF2-40B4-BE49-F238E27FC236}">
-                <a16:creationId xmlns:a16="http://schemas.microsoft.com/office/drawing/2014/main" id="{39F8F2D3-3324-D549-9BF9-A5F8C04DCBEB}"/>
+                <a16:creationId xmlns:a16="http://schemas.microsoft.com/office/drawing/2014/main" id="{AEB76E62-224D-9644-8C68-253C13D92B73}"/>
               </a:ext>
             </a:extLst>
           </p:cNvPr>
@@ -8002,7 +7682,7 @@
         </p:nvSpPr>
         <p:spPr>
           <a:xfrm>
-            <a:off x="2102195" y="3111418"/>
+            <a:off x="2102195" y="3126333"/>
             <a:ext cx="928695" cy="253916"/>
           </a:xfrm>
           <a:prstGeom prst="rect">
@@ -8032,10 +7712,10 @@
       </p:sp>
       <p:sp>
         <p:nvSpPr>
-          <p:cNvPr id="485" name="TextBox 484">
+          <p:cNvPr id="96" name="TextBox 95">
             <a:extLst>
               <a:ext uri="{FF2B5EF4-FFF2-40B4-BE49-F238E27FC236}">
-                <a16:creationId xmlns:a16="http://schemas.microsoft.com/office/drawing/2014/main" id="{75946CED-CD01-444F-9F27-AFE4914137E6}"/>
+                <a16:creationId xmlns:a16="http://schemas.microsoft.com/office/drawing/2014/main" id="{B1EC392C-1177-F646-A481-482C30CA83A7}"/>
               </a:ext>
             </a:extLst>
           </p:cNvPr>
@@ -8044,7 +7724,7 @@
         </p:nvSpPr>
         <p:spPr>
           <a:xfrm>
-            <a:off x="3254324" y="3111418"/>
+            <a:off x="3254324" y="3126333"/>
             <a:ext cx="928695" cy="253916"/>
           </a:xfrm>
           <a:prstGeom prst="rect">
@@ -8074,10 +7754,10 @@
       </p:sp>
       <p:sp>
         <p:nvSpPr>
-          <p:cNvPr id="486" name="Rectangle 485">
+          <p:cNvPr id="97" name="Rectangle 96">
             <a:extLst>
               <a:ext uri="{FF2B5EF4-FFF2-40B4-BE49-F238E27FC236}">
-                <a16:creationId xmlns:a16="http://schemas.microsoft.com/office/drawing/2014/main" id="{402A4A64-9BEC-E045-B23B-B0CE181E9C8B}"/>
+                <a16:creationId xmlns:a16="http://schemas.microsoft.com/office/drawing/2014/main" id="{EEEAE555-1BE8-4445-A095-0D533946C5E2}"/>
               </a:ext>
             </a:extLst>
           </p:cNvPr>
@@ -8086,7 +7766,7 @@
         </p:nvSpPr>
         <p:spPr>
           <a:xfrm>
-            <a:off x="2122145" y="2868016"/>
+            <a:off x="2122145" y="2882931"/>
             <a:ext cx="571504" cy="252000"/>
           </a:xfrm>
           <a:prstGeom prst="rect">
@@ -8129,10 +7809,10 @@
       </p:sp>
       <p:sp>
         <p:nvSpPr>
-          <p:cNvPr id="487" name="TextBox 486">
+          <p:cNvPr id="98" name="TextBox 97">
             <a:extLst>
               <a:ext uri="{FF2B5EF4-FFF2-40B4-BE49-F238E27FC236}">
-                <a16:creationId xmlns:a16="http://schemas.microsoft.com/office/drawing/2014/main" id="{272893E8-3FEF-DE4F-B2F2-15161623FB19}"/>
+                <a16:creationId xmlns:a16="http://schemas.microsoft.com/office/drawing/2014/main" id="{4E02A343-5AF1-8645-917C-E7797D49EC35}"/>
               </a:ext>
             </a:extLst>
           </p:cNvPr>
@@ -8141,7 +7821,7 @@
         </p:nvSpPr>
         <p:spPr>
           <a:xfrm>
-            <a:off x="1550641" y="2861278"/>
+            <a:off x="1550641" y="2876193"/>
             <a:ext cx="928695" cy="276999"/>
           </a:xfrm>
           <a:prstGeom prst="rect">
@@ -8171,10 +7851,10 @@
       </p:sp>
       <p:sp>
         <p:nvSpPr>
-          <p:cNvPr id="488" name="TextBox 487">
+          <p:cNvPr id="99" name="TextBox 98">
             <a:extLst>
               <a:ext uri="{FF2B5EF4-FFF2-40B4-BE49-F238E27FC236}">
-                <a16:creationId xmlns:a16="http://schemas.microsoft.com/office/drawing/2014/main" id="{E7E10762-B635-AE47-98FA-0349326736DA}"/>
+                <a16:creationId xmlns:a16="http://schemas.microsoft.com/office/drawing/2014/main" id="{9F7AE993-3595-2B41-BC52-15DCD532DA93}"/>
               </a:ext>
             </a:extLst>
           </p:cNvPr>
@@ -8183,7 +7863,7 @@
         </p:nvSpPr>
         <p:spPr>
           <a:xfrm>
-            <a:off x="2246212" y="2860607"/>
+            <a:off x="2246212" y="2875522"/>
             <a:ext cx="928695" cy="276999"/>
           </a:xfrm>
           <a:prstGeom prst="rect">
@@ -8213,10 +7893,10 @@
       </p:sp>
       <p:sp>
         <p:nvSpPr>
-          <p:cNvPr id="489" name="Freeform 488">
+          <p:cNvPr id="100" name="Freeform 99">
             <a:extLst>
               <a:ext uri="{FF2B5EF4-FFF2-40B4-BE49-F238E27FC236}">
-                <a16:creationId xmlns:a16="http://schemas.microsoft.com/office/drawing/2014/main" id="{74FA75E1-6CF0-C84A-8443-05EAC65EF6CC}"/>
+                <a16:creationId xmlns:a16="http://schemas.microsoft.com/office/drawing/2014/main" id="{68B8BB39-C7BC-554A-86FC-06A57FE30D77}"/>
               </a:ext>
             </a:extLst>
           </p:cNvPr>
@@ -8225,7 +7905,7 @@
         </p:nvSpPr>
         <p:spPr>
           <a:xfrm>
-            <a:off x="1945949" y="2563752"/>
+            <a:off x="1945949" y="2578667"/>
             <a:ext cx="190500" cy="225425"/>
           </a:xfrm>
           <a:custGeom>
@@ -8313,10 +7993,10 @@
       </p:sp>
       <p:sp>
         <p:nvSpPr>
-          <p:cNvPr id="490" name="Freeform 489">
+          <p:cNvPr id="101" name="Freeform 100">
             <a:extLst>
               <a:ext uri="{FF2B5EF4-FFF2-40B4-BE49-F238E27FC236}">
-                <a16:creationId xmlns:a16="http://schemas.microsoft.com/office/drawing/2014/main" id="{65BB69DD-70D1-1C4C-8A0B-4630641EE7E0}"/>
+                <a16:creationId xmlns:a16="http://schemas.microsoft.com/office/drawing/2014/main" id="{CA9B7CF8-F1B5-394E-8738-166A878B4DC3}"/>
               </a:ext>
             </a:extLst>
           </p:cNvPr>
@@ -8325,7 +8005,7 @@
         </p:nvSpPr>
         <p:spPr>
           <a:xfrm>
-            <a:off x="2646025" y="2574855"/>
+            <a:off x="2646025" y="2589770"/>
             <a:ext cx="190500" cy="225425"/>
           </a:xfrm>
           <a:custGeom>
@@ -8413,10 +8093,10 @@
       </p:sp>
       <p:cxnSp>
         <p:nvCxnSpPr>
-          <p:cNvPr id="491" name="Straight Connector 490">
+          <p:cNvPr id="102" name="Straight Connector 101">
             <a:extLst>
               <a:ext uri="{FF2B5EF4-FFF2-40B4-BE49-F238E27FC236}">
-                <a16:creationId xmlns:a16="http://schemas.microsoft.com/office/drawing/2014/main" id="{F9CE0C7A-8EB1-D94E-9A24-181C71F7C120}"/>
+                <a16:creationId xmlns:a16="http://schemas.microsoft.com/office/drawing/2014/main" id="{1DDD1B67-B3AB-3F40-ACE6-FD8A507A0863}"/>
               </a:ext>
             </a:extLst>
           </p:cNvPr>
@@ -8425,7 +8105,7 @@
         </p:nvCxnSpPr>
         <p:spPr>
           <a:xfrm rot="5400000">
-            <a:off x="4935932" y="3002688"/>
+            <a:off x="4935932" y="3017603"/>
             <a:ext cx="285752" cy="1588"/>
           </a:xfrm>
           <a:prstGeom prst="line">
@@ -8454,10 +8134,10 @@
       </p:cxnSp>
       <p:sp>
         <p:nvSpPr>
-          <p:cNvPr id="492" name="TextBox 491">
+          <p:cNvPr id="103" name="TextBox 102">
             <a:extLst>
               <a:ext uri="{FF2B5EF4-FFF2-40B4-BE49-F238E27FC236}">
-                <a16:creationId xmlns:a16="http://schemas.microsoft.com/office/drawing/2014/main" id="{6C666ABD-74E2-D141-BB05-6646CECE9FB6}"/>
+                <a16:creationId xmlns:a16="http://schemas.microsoft.com/office/drawing/2014/main" id="{EB32E602-6DDB-5F45-BB5B-E5D1BE3FFCF3}"/>
               </a:ext>
             </a:extLst>
           </p:cNvPr>
@@ -8466,7 +8146,7 @@
         </p:nvSpPr>
         <p:spPr>
           <a:xfrm>
-            <a:off x="1764956" y="2289102"/>
+            <a:off x="1764956" y="2304017"/>
             <a:ext cx="928695" cy="276999"/>
           </a:xfrm>
           <a:prstGeom prst="rect">
@@ -8496,10 +8176,10 @@
       </p:sp>
       <p:sp>
         <p:nvSpPr>
-          <p:cNvPr id="493" name="TextBox 492">
+          <p:cNvPr id="104" name="TextBox 103">
             <a:extLst>
               <a:ext uri="{FF2B5EF4-FFF2-40B4-BE49-F238E27FC236}">
-                <a16:creationId xmlns:a16="http://schemas.microsoft.com/office/drawing/2014/main" id="{D6B53667-7781-AB42-B5CD-43EB2DC73652}"/>
+                <a16:creationId xmlns:a16="http://schemas.microsoft.com/office/drawing/2014/main" id="{81644E6C-7A0B-4D4E-B95E-582880BDB0CF}"/>
               </a:ext>
             </a:extLst>
           </p:cNvPr>
@@ -8508,7 +8188,7 @@
         </p:nvSpPr>
         <p:spPr>
           <a:xfrm>
-            <a:off x="2479336" y="2289102"/>
+            <a:off x="2479336" y="2304017"/>
             <a:ext cx="928695" cy="276999"/>
           </a:xfrm>
           <a:prstGeom prst="rect">
@@ -8538,10 +8218,10 @@
       </p:sp>
       <p:sp>
         <p:nvSpPr>
-          <p:cNvPr id="494" name="TextBox 493">
+          <p:cNvPr id="105" name="TextBox 104">
             <a:extLst>
               <a:ext uri="{FF2B5EF4-FFF2-40B4-BE49-F238E27FC236}">
-                <a16:creationId xmlns:a16="http://schemas.microsoft.com/office/drawing/2014/main" id="{4116F8B4-D0FC-8E4E-98F6-B2ADCF0A1665}"/>
+                <a16:creationId xmlns:a16="http://schemas.microsoft.com/office/drawing/2014/main" id="{5655AED0-A9EE-054D-8716-D7D25A6EE438}"/>
               </a:ext>
             </a:extLst>
           </p:cNvPr>
@@ -8550,7 +8230,7 @@
         </p:nvSpPr>
         <p:spPr>
           <a:xfrm>
-            <a:off x="0" y="0"/>
+            <a:off x="0" y="14915"/>
             <a:ext cx="395536" cy="307777"/>
           </a:xfrm>
           <a:prstGeom prst="rect">
@@ -8576,10 +8256,10 @@
       </p:sp>
       <p:sp>
         <p:nvSpPr>
-          <p:cNvPr id="495" name="Rectangle 494">
+          <p:cNvPr id="106" name="Rectangle 105">
             <a:extLst>
               <a:ext uri="{FF2B5EF4-FFF2-40B4-BE49-F238E27FC236}">
-                <a16:creationId xmlns:a16="http://schemas.microsoft.com/office/drawing/2014/main" id="{36C08DCB-6153-4647-9E88-C6517AEACB22}"/>
+                <a16:creationId xmlns:a16="http://schemas.microsoft.com/office/drawing/2014/main" id="{F15BE992-C573-B946-B3C2-23B318583B74}"/>
               </a:ext>
             </a:extLst>
           </p:cNvPr>
@@ -8588,7 +8268,7 @@
         </p:nvSpPr>
         <p:spPr>
           <a:xfrm>
-            <a:off x="975531" y="2868016"/>
+            <a:off x="975531" y="2882931"/>
             <a:ext cx="500067" cy="252000"/>
           </a:xfrm>
           <a:prstGeom prst="rect">
@@ -8631,10 +8311,10 @@
       </p:sp>
       <p:sp>
         <p:nvSpPr>
-          <p:cNvPr id="496" name="TextBox 495">
+          <p:cNvPr id="107" name="TextBox 106">
             <a:extLst>
               <a:ext uri="{FF2B5EF4-FFF2-40B4-BE49-F238E27FC236}">
-                <a16:creationId xmlns:a16="http://schemas.microsoft.com/office/drawing/2014/main" id="{9FE0BE97-D2B0-3542-A50D-141B6C8FE359}"/>
+                <a16:creationId xmlns:a16="http://schemas.microsoft.com/office/drawing/2014/main" id="{3A174AB8-AC57-4545-9D2C-A870448E2FAC}"/>
               </a:ext>
             </a:extLst>
           </p:cNvPr>
@@ -8643,7 +8323,7 @@
         </p:nvSpPr>
         <p:spPr>
           <a:xfrm>
-            <a:off x="975147" y="2861278"/>
+            <a:off x="975147" y="2876193"/>
             <a:ext cx="928695" cy="276999"/>
           </a:xfrm>
           <a:prstGeom prst="rect">
@@ -8673,10 +8353,10 @@
       </p:sp>
       <p:sp>
         <p:nvSpPr>
-          <p:cNvPr id="497" name="TextBox 496">
+          <p:cNvPr id="108" name="TextBox 107">
             <a:extLst>
               <a:ext uri="{FF2B5EF4-FFF2-40B4-BE49-F238E27FC236}">
-                <a16:creationId xmlns:a16="http://schemas.microsoft.com/office/drawing/2014/main" id="{BCA89546-600F-1743-9A76-9CA78E913EEC}"/>
+                <a16:creationId xmlns:a16="http://schemas.microsoft.com/office/drawing/2014/main" id="{1205FCA9-E6EB-2C46-A92D-D062C5379F08}"/>
               </a:ext>
             </a:extLst>
           </p:cNvPr>
@@ -8709,12 +8389,291 @@
           </a:p>
         </p:txBody>
       </p:sp>
+      <p:sp>
+        <p:nvSpPr>
+          <p:cNvPr id="109" name="Rectangle 108">
+            <a:extLst>
+              <a:ext uri="{FF2B5EF4-FFF2-40B4-BE49-F238E27FC236}">
+                <a16:creationId xmlns:a16="http://schemas.microsoft.com/office/drawing/2014/main" id="{00A24847-A454-1549-9705-D949C36EFE80}"/>
+              </a:ext>
+            </a:extLst>
+          </p:cNvPr>
+          <p:cNvSpPr/>
+          <p:nvPr/>
+        </p:nvSpPr>
+        <p:spPr>
+          <a:xfrm>
+            <a:off x="7795629" y="85377"/>
+            <a:ext cx="1111394" cy="276999"/>
+          </a:xfrm>
+          <a:prstGeom prst="rect">
+            <a:avLst/>
+          </a:prstGeom>
+        </p:spPr>
+        <p:txBody>
+          <a:bodyPr wrap="none">
+            <a:spAutoFit/>
+          </a:bodyPr>
+          <a:lstStyle/>
+          <a:p>
+            <a:r>
+              <a:rPr lang="en-GB" sz="1200" b="1" dirty="0">
+                <a:latin typeface="Calibri" panose="020F0502020204030204" pitchFamily="34" charset="0"/>
+                <a:cs typeface="Calibri" panose="020F0502020204030204" pitchFamily="34" charset="0"/>
+              </a:rPr>
+              <a:t>Anti - GFP blot</a:t>
+            </a:r>
+          </a:p>
+        </p:txBody>
+      </p:sp>
+      <p:pic>
+        <p:nvPicPr>
+          <p:cNvPr id="110" name="Picture 15">
+            <a:extLst>
+              <a:ext uri="{FF2B5EF4-FFF2-40B4-BE49-F238E27FC236}">
+                <a16:creationId xmlns:a16="http://schemas.microsoft.com/office/drawing/2014/main" id="{C44370FD-6E4A-1646-B0AF-0E66078ABBD5}"/>
+              </a:ext>
+            </a:extLst>
+          </p:cNvPr>
+          <p:cNvPicPr>
+            <a:picLocks noChangeAspect="1" noChangeArrowheads="1"/>
+          </p:cNvPicPr>
+          <p:nvPr/>
+        </p:nvPicPr>
+        <p:blipFill>
+          <a:blip r:embed="rId5" cstate="print">
+            <a:extLst>
+              <a:ext uri="{BEBA8EAE-BF5A-486C-A8C5-ECC9F3942E4B}">
+                <a14:imgProps xmlns:a14="http://schemas.microsoft.com/office/drawing/2010/main">
+                  <a14:imgLayer r:embed="rId6">
+                    <a14:imgEffect>
+                      <a14:brightnessContrast bright="4000" contrast="20000"/>
+                    </a14:imgEffect>
+                  </a14:imgLayer>
+                </a14:imgProps>
+              </a:ext>
+            </a:extLst>
+          </a:blip>
+          <a:srcRect l="8014" t="16183" r="19765" b="44515"/>
+          <a:stretch>
+            <a:fillRect/>
+          </a:stretch>
+        </p:blipFill>
+        <p:spPr bwMode="auto">
+          <a:xfrm>
+            <a:off x="6639677" y="4432395"/>
+            <a:ext cx="3564000" cy="977225"/>
+          </a:xfrm>
+          <a:prstGeom prst="rect">
+            <a:avLst/>
+          </a:prstGeom>
+          <a:noFill/>
+          <a:ln w="9525">
+            <a:solidFill>
+              <a:schemeClr val="tx1"/>
+            </a:solidFill>
+            <a:miter lim="800000"/>
+            <a:headEnd/>
+            <a:tailEnd/>
+          </a:ln>
+          <a:effectLst/>
+        </p:spPr>
+      </p:pic>
+      <p:sp>
+        <p:nvSpPr>
+          <p:cNvPr id="111" name="Rectangle 110">
+            <a:extLst>
+              <a:ext uri="{FF2B5EF4-FFF2-40B4-BE49-F238E27FC236}">
+                <a16:creationId xmlns:a16="http://schemas.microsoft.com/office/drawing/2014/main" id="{F3FC8956-1B69-4C45-AAD3-B6D509A8D1EA}"/>
+              </a:ext>
+            </a:extLst>
+          </p:cNvPr>
+          <p:cNvSpPr/>
+          <p:nvPr/>
+        </p:nvSpPr>
+        <p:spPr>
+          <a:xfrm>
+            <a:off x="7898845" y="4010264"/>
+            <a:ext cx="1034450" cy="276999"/>
+          </a:xfrm>
+          <a:prstGeom prst="rect">
+            <a:avLst/>
+          </a:prstGeom>
+        </p:spPr>
+        <p:txBody>
+          <a:bodyPr wrap="none">
+            <a:spAutoFit/>
+          </a:bodyPr>
+          <a:lstStyle/>
+          <a:p>
+            <a:r>
+              <a:rPr lang="en-GB" sz="1200" b="1" dirty="0">
+                <a:latin typeface="Calibri" panose="020F0502020204030204" pitchFamily="34" charset="0"/>
+                <a:cs typeface="Calibri" panose="020F0502020204030204" pitchFamily="34" charset="0"/>
+              </a:rPr>
+              <a:t>Anti - Ha blot</a:t>
+            </a:r>
+          </a:p>
+        </p:txBody>
+      </p:sp>
+      <p:sp>
+        <p:nvSpPr>
+          <p:cNvPr id="112" name="TextBox 111">
+            <a:extLst>
+              <a:ext uri="{FF2B5EF4-FFF2-40B4-BE49-F238E27FC236}">
+                <a16:creationId xmlns:a16="http://schemas.microsoft.com/office/drawing/2014/main" id="{995F4F95-5E77-4E40-8B47-6B80F8DB28AE}"/>
+              </a:ext>
+            </a:extLst>
+          </p:cNvPr>
+          <p:cNvSpPr txBox="1"/>
+          <p:nvPr/>
+        </p:nvSpPr>
+        <p:spPr>
+          <a:xfrm>
+            <a:off x="6084741" y="4397287"/>
+            <a:ext cx="2523350" cy="230832"/>
+          </a:xfrm>
+          <a:prstGeom prst="rect">
+            <a:avLst/>
+          </a:prstGeom>
+          <a:noFill/>
+        </p:spPr>
+        <p:txBody>
+          <a:bodyPr wrap="square" rtlCol="0">
+            <a:spAutoFit/>
+          </a:bodyPr>
+          <a:lstStyle/>
+          <a:p>
+            <a:r>
+              <a:rPr lang="en-GB" sz="900" b="1" dirty="0">
+                <a:latin typeface="Calibri" panose="020F0502020204030204" pitchFamily="34" charset="0"/>
+                <a:cs typeface="Calibri" panose="020F0502020204030204" pitchFamily="34" charset="0"/>
+              </a:rPr>
+              <a:t>  150kDa</a:t>
+            </a:r>
+          </a:p>
+        </p:txBody>
+      </p:sp>
+      <p:sp>
+        <p:nvSpPr>
+          <p:cNvPr id="113" name="TextBox 112">
+            <a:extLst>
+              <a:ext uri="{FF2B5EF4-FFF2-40B4-BE49-F238E27FC236}">
+                <a16:creationId xmlns:a16="http://schemas.microsoft.com/office/drawing/2014/main" id="{80716151-2D25-C34E-B96E-14CCC50AF3CA}"/>
+              </a:ext>
+            </a:extLst>
+          </p:cNvPr>
+          <p:cNvSpPr txBox="1"/>
+          <p:nvPr/>
+        </p:nvSpPr>
+        <p:spPr>
+          <a:xfrm>
+            <a:off x="6084741" y="4603305"/>
+            <a:ext cx="2523350" cy="230832"/>
+          </a:xfrm>
+          <a:prstGeom prst="rect">
+            <a:avLst/>
+          </a:prstGeom>
+          <a:noFill/>
+        </p:spPr>
+        <p:txBody>
+          <a:bodyPr wrap="square" rtlCol="0">
+            <a:spAutoFit/>
+          </a:bodyPr>
+          <a:lstStyle/>
+          <a:p>
+            <a:r>
+              <a:rPr lang="en-GB" sz="900" b="1" dirty="0">
+                <a:latin typeface="Calibri" panose="020F0502020204030204" pitchFamily="34" charset="0"/>
+                <a:cs typeface="Calibri" panose="020F0502020204030204" pitchFamily="34" charset="0"/>
+              </a:rPr>
+              <a:t>  100kDa</a:t>
+            </a:r>
+          </a:p>
+        </p:txBody>
+      </p:sp>
+      <p:sp>
+        <p:nvSpPr>
+          <p:cNvPr id="114" name="TextBox 113">
+            <a:extLst>
+              <a:ext uri="{FF2B5EF4-FFF2-40B4-BE49-F238E27FC236}">
+                <a16:creationId xmlns:a16="http://schemas.microsoft.com/office/drawing/2014/main" id="{EEE2CE01-2F96-324F-B087-8D4D98943378}"/>
+              </a:ext>
+            </a:extLst>
+          </p:cNvPr>
+          <p:cNvSpPr txBox="1"/>
+          <p:nvPr/>
+        </p:nvSpPr>
+        <p:spPr>
+          <a:xfrm>
+            <a:off x="6120741" y="4777625"/>
+            <a:ext cx="2523350" cy="230832"/>
+          </a:xfrm>
+          <a:prstGeom prst="rect">
+            <a:avLst/>
+          </a:prstGeom>
+          <a:noFill/>
+        </p:spPr>
+        <p:txBody>
+          <a:bodyPr wrap="square" rtlCol="0">
+            <a:spAutoFit/>
+          </a:bodyPr>
+          <a:lstStyle/>
+          <a:p>
+            <a:r>
+              <a:rPr lang="en-GB" sz="900" b="1" dirty="0">
+                <a:latin typeface="Calibri" panose="020F0502020204030204" pitchFamily="34" charset="0"/>
+                <a:cs typeface="Calibri" panose="020F0502020204030204" pitchFamily="34" charset="0"/>
+              </a:rPr>
+              <a:t>  75kDa</a:t>
+            </a:r>
+          </a:p>
+        </p:txBody>
+      </p:sp>
+      <p:sp>
+        <p:nvSpPr>
+          <p:cNvPr id="115" name="TextBox 114">
+            <a:extLst>
+              <a:ext uri="{FF2B5EF4-FFF2-40B4-BE49-F238E27FC236}">
+                <a16:creationId xmlns:a16="http://schemas.microsoft.com/office/drawing/2014/main" id="{6A41EBB7-8D4F-7549-A91A-DAC2C8C42579}"/>
+              </a:ext>
+            </a:extLst>
+          </p:cNvPr>
+          <p:cNvSpPr txBox="1"/>
+          <p:nvPr/>
+        </p:nvSpPr>
+        <p:spPr>
+          <a:xfrm>
+            <a:off x="6120741" y="5167189"/>
+            <a:ext cx="2523350" cy="230832"/>
+          </a:xfrm>
+          <a:prstGeom prst="rect">
+            <a:avLst/>
+          </a:prstGeom>
+          <a:noFill/>
+        </p:spPr>
+        <p:txBody>
+          <a:bodyPr wrap="square" rtlCol="0">
+            <a:spAutoFit/>
+          </a:bodyPr>
+          <a:lstStyle/>
+          <a:p>
+            <a:r>
+              <a:rPr lang="en-GB" sz="900" b="1" dirty="0">
+                <a:latin typeface="Calibri" panose="020F0502020204030204" pitchFamily="34" charset="0"/>
+                <a:cs typeface="Calibri" panose="020F0502020204030204" pitchFamily="34" charset="0"/>
+              </a:rPr>
+              <a:t>  50kDa</a:t>
+            </a:r>
+          </a:p>
+        </p:txBody>
+      </p:sp>
       <p:cxnSp>
         <p:nvCxnSpPr>
-          <p:cNvPr id="498" name="Straight Arrow Connector 497">
+          <p:cNvPr id="116" name="Straight Arrow Connector 115">
             <a:extLst>
               <a:ext uri="{FF2B5EF4-FFF2-40B4-BE49-F238E27FC236}">
-                <a16:creationId xmlns:a16="http://schemas.microsoft.com/office/drawing/2014/main" id="{50CDAB8F-AC80-6441-A527-17D21BE72089}"/>
+                <a16:creationId xmlns:a16="http://schemas.microsoft.com/office/drawing/2014/main" id="{7E6F71BB-3528-FB4C-BE1B-556245C1FDAB}"/>
               </a:ext>
             </a:extLst>
           </p:cNvPr>
@@ -8723,7 +8682,7 @@
         </p:nvCxnSpPr>
         <p:spPr>
           <a:xfrm flipH="1">
-            <a:off x="10203102" y="6444528"/>
+            <a:off x="10203102" y="2109240"/>
             <a:ext cx="197923" cy="0"/>
           </a:xfrm>
           <a:prstGeom prst="straightConnector1">
@@ -8755,10 +8714,10 @@
       </p:cxnSp>
       <p:cxnSp>
         <p:nvCxnSpPr>
-          <p:cNvPr id="499" name="Straight Arrow Connector 498">
+          <p:cNvPr id="117" name="Straight Arrow Connector 116">
             <a:extLst>
               <a:ext uri="{FF2B5EF4-FFF2-40B4-BE49-F238E27FC236}">
-                <a16:creationId xmlns:a16="http://schemas.microsoft.com/office/drawing/2014/main" id="{8A1367EC-3D8F-D147-81DD-D5E87BAF6272}"/>
+                <a16:creationId xmlns:a16="http://schemas.microsoft.com/office/drawing/2014/main" id="{02B27997-C3AF-494B-9789-D4924746B467}"/>
               </a:ext>
             </a:extLst>
           </p:cNvPr>
@@ -8767,7 +8726,7 @@
         </p:nvCxnSpPr>
         <p:spPr>
           <a:xfrm flipH="1">
-            <a:off x="10203102" y="7092672"/>
+            <a:off x="10203102" y="2829392"/>
             <a:ext cx="197923" cy="0"/>
           </a:xfrm>
           <a:prstGeom prst="straightConnector1">
@@ -8799,10 +8758,10 @@
       </p:cxnSp>
       <p:cxnSp>
         <p:nvCxnSpPr>
-          <p:cNvPr id="500" name="Straight Arrow Connector 499">
+          <p:cNvPr id="118" name="Straight Arrow Connector 117">
             <a:extLst>
               <a:ext uri="{FF2B5EF4-FFF2-40B4-BE49-F238E27FC236}">
-                <a16:creationId xmlns:a16="http://schemas.microsoft.com/office/drawing/2014/main" id="{65AD3519-4585-8446-BA6E-ADD62ABEE66D}"/>
+                <a16:creationId xmlns:a16="http://schemas.microsoft.com/office/drawing/2014/main" id="{14F24DC4-30D3-D847-890E-26617F5308D4}"/>
               </a:ext>
             </a:extLst>
           </p:cNvPr>
@@ -8811,7 +8770,7 @@
         </p:nvCxnSpPr>
         <p:spPr>
           <a:xfrm flipH="1">
-            <a:off x="10203102" y="7509560"/>
+            <a:off x="10203102" y="3189080"/>
             <a:ext cx="197923" cy="0"/>
           </a:xfrm>
           <a:prstGeom prst="straightConnector1">
@@ -8843,10 +8802,10 @@
       </p:cxnSp>
       <p:sp>
         <p:nvSpPr>
-          <p:cNvPr id="501" name="TextBox 500">
+          <p:cNvPr id="119" name="TextBox 118">
             <a:extLst>
               <a:ext uri="{FF2B5EF4-FFF2-40B4-BE49-F238E27FC236}">
-                <a16:creationId xmlns:a16="http://schemas.microsoft.com/office/drawing/2014/main" id="{F4644829-416E-F941-B63C-404B6AD37E09}"/>
+                <a16:creationId xmlns:a16="http://schemas.microsoft.com/office/drawing/2014/main" id="{61F94118-E848-634B-A6AD-1B7CB81110C0}"/>
               </a:ext>
             </a:extLst>
           </p:cNvPr>
@@ -8855,8 +8814,8 @@
         </p:nvSpPr>
         <p:spPr>
           <a:xfrm>
-            <a:off x="10365048" y="7378998"/>
-            <a:ext cx="2428512" cy="261610"/>
+            <a:off x="10365046" y="3058998"/>
+            <a:ext cx="2375939" cy="261610"/>
           </a:xfrm>
           <a:prstGeom prst="rect">
             <a:avLst/>
@@ -8874,17 +8833,17 @@
                 <a:latin typeface="Calibri" panose="020F0502020204030204" pitchFamily="34" charset="0"/>
                 <a:cs typeface="Calibri" panose="020F0502020204030204" pitchFamily="34" charset="0"/>
               </a:rPr>
-              <a:t>Termination product (g6)</a:t>
-            </a:r>
-          </a:p>
-        </p:txBody>
-      </p:sp>
-      <p:sp>
-        <p:nvSpPr>
-          <p:cNvPr id="502" name="TextBox 501">
+              <a:t>Termination product (g6) - 36.9kDa</a:t>
+            </a:r>
+          </a:p>
+        </p:txBody>
+      </p:sp>
+      <p:sp>
+        <p:nvSpPr>
+          <p:cNvPr id="120" name="TextBox 119">
             <a:extLst>
               <a:ext uri="{FF2B5EF4-FFF2-40B4-BE49-F238E27FC236}">
-                <a16:creationId xmlns:a16="http://schemas.microsoft.com/office/drawing/2014/main" id="{3C1DDD37-3358-3B41-8B1D-1770B514D720}"/>
+                <a16:creationId xmlns:a16="http://schemas.microsoft.com/office/drawing/2014/main" id="{0456B09F-B88D-284D-ADAA-3A41A3B9C5C5}"/>
               </a:ext>
             </a:extLst>
           </p:cNvPr>
@@ -8893,8 +8852,8 @@
         </p:nvSpPr>
         <p:spPr>
           <a:xfrm>
-            <a:off x="10365046" y="6946998"/>
-            <a:ext cx="2508675" cy="261610"/>
+            <a:off x="10365048" y="2698998"/>
+            <a:ext cx="2087653" cy="261610"/>
           </a:xfrm>
           <a:prstGeom prst="rect">
             <a:avLst/>
@@ -8912,17 +8871,17 @@
                 <a:latin typeface="Calibri" panose="020F0502020204030204" pitchFamily="34" charset="0"/>
                 <a:cs typeface="Calibri" panose="020F0502020204030204" pitchFamily="34" charset="0"/>
               </a:rPr>
-              <a:t>Recode product g6-7 </a:t>
-            </a:r>
-          </a:p>
-        </p:txBody>
-      </p:sp>
-      <p:sp>
-        <p:nvSpPr>
-          <p:cNvPr id="503" name="TextBox 502">
+              <a:t>Recode product g6_7 - 52.4 kDa</a:t>
+            </a:r>
+          </a:p>
+        </p:txBody>
+      </p:sp>
+      <p:sp>
+        <p:nvSpPr>
+          <p:cNvPr id="121" name="TextBox 120">
             <a:extLst>
               <a:ext uri="{FF2B5EF4-FFF2-40B4-BE49-F238E27FC236}">
-                <a16:creationId xmlns:a16="http://schemas.microsoft.com/office/drawing/2014/main" id="{83602DF9-F90D-1948-81D6-8FBC91CA3297}"/>
+                <a16:creationId xmlns:a16="http://schemas.microsoft.com/office/drawing/2014/main" id="{6B87B88A-91B7-F443-988C-18AF545B53A9}"/>
               </a:ext>
             </a:extLst>
           </p:cNvPr>
@@ -8931,8 +8890,8 @@
         </p:nvSpPr>
         <p:spPr>
           <a:xfrm>
-            <a:off x="10365048" y="6298998"/>
-            <a:ext cx="2272699" cy="261610"/>
+            <a:off x="10365048" y="1978998"/>
+            <a:ext cx="2428512" cy="261610"/>
           </a:xfrm>
           <a:prstGeom prst="rect">
             <a:avLst/>
@@ -8950,333 +8909,17 @@
                 <a:latin typeface="Calibri" panose="020F0502020204030204" pitchFamily="34" charset="0"/>
                 <a:cs typeface="Calibri" panose="020F0502020204030204" pitchFamily="34" charset="0"/>
               </a:rPr>
-              <a:t>Recode product g6-7-8 </a:t>
-            </a:r>
-          </a:p>
-        </p:txBody>
-      </p:sp>
-      <p:sp>
-        <p:nvSpPr>
-          <p:cNvPr id="504" name="Rectangle 503">
+              <a:t>Recode product g6_7_8 - 113.2 kDa</a:t>
+            </a:r>
+          </a:p>
+        </p:txBody>
+      </p:sp>
+      <p:cxnSp>
+        <p:nvCxnSpPr>
+          <p:cNvPr id="122" name="Straight Arrow Connector 121">
             <a:extLst>
               <a:ext uri="{FF2B5EF4-FFF2-40B4-BE49-F238E27FC236}">
-                <a16:creationId xmlns:a16="http://schemas.microsoft.com/office/drawing/2014/main" id="{A49EAA2C-7894-0A41-8972-72FD6370F69F}"/>
-              </a:ext>
-            </a:extLst>
-          </p:cNvPr>
-          <p:cNvSpPr/>
-          <p:nvPr/>
-        </p:nvSpPr>
-        <p:spPr>
-          <a:xfrm>
-            <a:off x="7795629" y="85377"/>
-            <a:ext cx="1111394" cy="276999"/>
-          </a:xfrm>
-          <a:prstGeom prst="rect">
-            <a:avLst/>
-          </a:prstGeom>
-        </p:spPr>
-        <p:txBody>
-          <a:bodyPr wrap="none">
-            <a:spAutoFit/>
-          </a:bodyPr>
-          <a:lstStyle/>
-          <a:p>
-            <a:r>
-              <a:rPr lang="en-GB" sz="1200" b="1" dirty="0">
-                <a:latin typeface="Calibri" panose="020F0502020204030204" pitchFamily="34" charset="0"/>
-                <a:cs typeface="Calibri" panose="020F0502020204030204" pitchFamily="34" charset="0"/>
-              </a:rPr>
-              <a:t>Anti - GFP blot</a:t>
-            </a:r>
-          </a:p>
-        </p:txBody>
-      </p:sp>
-      <p:sp>
-        <p:nvSpPr>
-          <p:cNvPr id="505" name="Rectangle 504">
-            <a:extLst>
-              <a:ext uri="{FF2B5EF4-FFF2-40B4-BE49-F238E27FC236}">
-                <a16:creationId xmlns:a16="http://schemas.microsoft.com/office/drawing/2014/main" id="{7F528287-3238-E045-B609-2121F89EF817}"/>
-              </a:ext>
-            </a:extLst>
-          </p:cNvPr>
-          <p:cNvSpPr/>
-          <p:nvPr/>
-        </p:nvSpPr>
-        <p:spPr>
-          <a:xfrm>
-            <a:off x="7726571" y="5547697"/>
-            <a:ext cx="1375698" cy="276999"/>
-          </a:xfrm>
-          <a:prstGeom prst="rect">
-            <a:avLst/>
-          </a:prstGeom>
-        </p:spPr>
-        <p:txBody>
-          <a:bodyPr wrap="none">
-            <a:spAutoFit/>
-          </a:bodyPr>
-          <a:lstStyle/>
-          <a:p>
-            <a:r>
-              <a:rPr lang="en-GB" sz="1200" b="1" dirty="0">
-                <a:latin typeface="Calibri" panose="020F0502020204030204" pitchFamily="34" charset="0"/>
-                <a:cs typeface="Calibri" panose="020F0502020204030204" pitchFamily="34" charset="0"/>
-              </a:rPr>
-              <a:t>    Composite blot </a:t>
-            </a:r>
-          </a:p>
-        </p:txBody>
-      </p:sp>
-      <p:pic>
-        <p:nvPicPr>
-          <p:cNvPr id="506" name="Picture 15">
-            <a:extLst>
-              <a:ext uri="{FF2B5EF4-FFF2-40B4-BE49-F238E27FC236}">
-                <a16:creationId xmlns:a16="http://schemas.microsoft.com/office/drawing/2014/main" id="{6A8DE2FE-F2AD-7B48-BF45-2A575583EB40}"/>
-              </a:ext>
-            </a:extLst>
-          </p:cNvPr>
-          <p:cNvPicPr>
-            <a:picLocks noChangeAspect="1" noChangeArrowheads="1"/>
-          </p:cNvPicPr>
-          <p:nvPr/>
-        </p:nvPicPr>
-        <p:blipFill>
-          <a:blip r:embed="rId7" cstate="print">
-            <a:extLst>
-              <a:ext uri="{BEBA8EAE-BF5A-486C-A8C5-ECC9F3942E4B}">
-                <a14:imgProps xmlns:a14="http://schemas.microsoft.com/office/drawing/2010/main">
-                  <a14:imgLayer r:embed="rId8">
-                    <a14:imgEffect>
-                      <a14:brightnessContrast bright="4000" contrast="20000"/>
-                    </a14:imgEffect>
-                  </a14:imgLayer>
-                </a14:imgProps>
-              </a:ext>
-            </a:extLst>
-          </a:blip>
-          <a:srcRect l="8014" t="16183" r="19765" b="44515"/>
-          <a:stretch>
-            <a:fillRect/>
-          </a:stretch>
-        </p:blipFill>
-        <p:spPr bwMode="auto">
-          <a:xfrm>
-            <a:off x="6639677" y="4432395"/>
-            <a:ext cx="3564000" cy="977225"/>
-          </a:xfrm>
-          <a:prstGeom prst="rect">
-            <a:avLst/>
-          </a:prstGeom>
-          <a:noFill/>
-          <a:ln w="9525">
-            <a:solidFill>
-              <a:schemeClr val="tx1"/>
-            </a:solidFill>
-            <a:miter lim="800000"/>
-            <a:headEnd/>
-            <a:tailEnd/>
-          </a:ln>
-          <a:effectLst/>
-        </p:spPr>
-      </p:pic>
-      <p:sp>
-        <p:nvSpPr>
-          <p:cNvPr id="507" name="Rectangle 506">
-            <a:extLst>
-              <a:ext uri="{FF2B5EF4-FFF2-40B4-BE49-F238E27FC236}">
-                <a16:creationId xmlns:a16="http://schemas.microsoft.com/office/drawing/2014/main" id="{D30BA397-AE65-A449-8B76-324ED4165673}"/>
-              </a:ext>
-            </a:extLst>
-          </p:cNvPr>
-          <p:cNvSpPr/>
-          <p:nvPr/>
-        </p:nvSpPr>
-        <p:spPr>
-          <a:xfrm>
-            <a:off x="7898845" y="4010264"/>
-            <a:ext cx="1034450" cy="276999"/>
-          </a:xfrm>
-          <a:prstGeom prst="rect">
-            <a:avLst/>
-          </a:prstGeom>
-        </p:spPr>
-        <p:txBody>
-          <a:bodyPr wrap="none">
-            <a:spAutoFit/>
-          </a:bodyPr>
-          <a:lstStyle/>
-          <a:p>
-            <a:r>
-              <a:rPr lang="en-GB" sz="1200" b="1" dirty="0">
-                <a:latin typeface="Calibri" panose="020F0502020204030204" pitchFamily="34" charset="0"/>
-                <a:cs typeface="Calibri" panose="020F0502020204030204" pitchFamily="34" charset="0"/>
-              </a:rPr>
-              <a:t>Anti - Ha blot</a:t>
-            </a:r>
-          </a:p>
-        </p:txBody>
-      </p:sp>
-      <p:sp>
-        <p:nvSpPr>
-          <p:cNvPr id="508" name="TextBox 507">
-            <a:extLst>
-              <a:ext uri="{FF2B5EF4-FFF2-40B4-BE49-F238E27FC236}">
-                <a16:creationId xmlns:a16="http://schemas.microsoft.com/office/drawing/2014/main" id="{5FB7EF7F-B569-F44B-B833-81CE3F5ECB13}"/>
-              </a:ext>
-            </a:extLst>
-          </p:cNvPr>
-          <p:cNvSpPr txBox="1"/>
-          <p:nvPr/>
-        </p:nvSpPr>
-        <p:spPr>
-          <a:xfrm>
-            <a:off x="6084741" y="4397287"/>
-            <a:ext cx="2523350" cy="230832"/>
-          </a:xfrm>
-          <a:prstGeom prst="rect">
-            <a:avLst/>
-          </a:prstGeom>
-          <a:noFill/>
-        </p:spPr>
-        <p:txBody>
-          <a:bodyPr wrap="square" rtlCol="0">
-            <a:spAutoFit/>
-          </a:bodyPr>
-          <a:lstStyle/>
-          <a:p>
-            <a:r>
-              <a:rPr lang="en-GB" sz="900" b="1" dirty="0">
-                <a:latin typeface="Calibri" panose="020F0502020204030204" pitchFamily="34" charset="0"/>
-                <a:cs typeface="Calibri" panose="020F0502020204030204" pitchFamily="34" charset="0"/>
-              </a:rPr>
-              <a:t>  150kDa</a:t>
-            </a:r>
-          </a:p>
-        </p:txBody>
-      </p:sp>
-      <p:sp>
-        <p:nvSpPr>
-          <p:cNvPr id="509" name="TextBox 508">
-            <a:extLst>
-              <a:ext uri="{FF2B5EF4-FFF2-40B4-BE49-F238E27FC236}">
-                <a16:creationId xmlns:a16="http://schemas.microsoft.com/office/drawing/2014/main" id="{FDA4586C-4534-0647-9F9A-21DC3DB9800C}"/>
-              </a:ext>
-            </a:extLst>
-          </p:cNvPr>
-          <p:cNvSpPr txBox="1"/>
-          <p:nvPr/>
-        </p:nvSpPr>
-        <p:spPr>
-          <a:xfrm>
-            <a:off x="6084741" y="4603305"/>
-            <a:ext cx="2523350" cy="230832"/>
-          </a:xfrm>
-          <a:prstGeom prst="rect">
-            <a:avLst/>
-          </a:prstGeom>
-          <a:noFill/>
-        </p:spPr>
-        <p:txBody>
-          <a:bodyPr wrap="square" rtlCol="0">
-            <a:spAutoFit/>
-          </a:bodyPr>
-          <a:lstStyle/>
-          <a:p>
-            <a:r>
-              <a:rPr lang="en-GB" sz="900" b="1" dirty="0">
-                <a:latin typeface="Calibri" panose="020F0502020204030204" pitchFamily="34" charset="0"/>
-                <a:cs typeface="Calibri" panose="020F0502020204030204" pitchFamily="34" charset="0"/>
-              </a:rPr>
-              <a:t>  100kDa</a:t>
-            </a:r>
-          </a:p>
-        </p:txBody>
-      </p:sp>
-      <p:sp>
-        <p:nvSpPr>
-          <p:cNvPr id="510" name="TextBox 509">
-            <a:extLst>
-              <a:ext uri="{FF2B5EF4-FFF2-40B4-BE49-F238E27FC236}">
-                <a16:creationId xmlns:a16="http://schemas.microsoft.com/office/drawing/2014/main" id="{FC47AB98-15CC-F04D-8C06-06DD2DF33051}"/>
-              </a:ext>
-            </a:extLst>
-          </p:cNvPr>
-          <p:cNvSpPr txBox="1"/>
-          <p:nvPr/>
-        </p:nvSpPr>
-        <p:spPr>
-          <a:xfrm>
-            <a:off x="6120741" y="4777625"/>
-            <a:ext cx="2523350" cy="230832"/>
-          </a:xfrm>
-          <a:prstGeom prst="rect">
-            <a:avLst/>
-          </a:prstGeom>
-          <a:noFill/>
-        </p:spPr>
-        <p:txBody>
-          <a:bodyPr wrap="square" rtlCol="0">
-            <a:spAutoFit/>
-          </a:bodyPr>
-          <a:lstStyle/>
-          <a:p>
-            <a:r>
-              <a:rPr lang="en-GB" sz="900" b="1" dirty="0">
-                <a:latin typeface="Calibri" panose="020F0502020204030204" pitchFamily="34" charset="0"/>
-                <a:cs typeface="Calibri" panose="020F0502020204030204" pitchFamily="34" charset="0"/>
-              </a:rPr>
-              <a:t>  75kDa</a:t>
-            </a:r>
-          </a:p>
-        </p:txBody>
-      </p:sp>
-      <p:sp>
-        <p:nvSpPr>
-          <p:cNvPr id="511" name="TextBox 510">
-            <a:extLst>
-              <a:ext uri="{FF2B5EF4-FFF2-40B4-BE49-F238E27FC236}">
-                <a16:creationId xmlns:a16="http://schemas.microsoft.com/office/drawing/2014/main" id="{71B45FC6-F579-9E40-9F52-4BFAFBBF6C35}"/>
-              </a:ext>
-            </a:extLst>
-          </p:cNvPr>
-          <p:cNvSpPr txBox="1"/>
-          <p:nvPr/>
-        </p:nvSpPr>
-        <p:spPr>
-          <a:xfrm>
-            <a:off x="6120741" y="5167189"/>
-            <a:ext cx="2523350" cy="230832"/>
-          </a:xfrm>
-          <a:prstGeom prst="rect">
-            <a:avLst/>
-          </a:prstGeom>
-          <a:noFill/>
-        </p:spPr>
-        <p:txBody>
-          <a:bodyPr wrap="square" rtlCol="0">
-            <a:spAutoFit/>
-          </a:bodyPr>
-          <a:lstStyle/>
-          <a:p>
-            <a:r>
-              <a:rPr lang="en-GB" sz="900" b="1" dirty="0">
-                <a:latin typeface="Calibri" panose="020F0502020204030204" pitchFamily="34" charset="0"/>
-                <a:cs typeface="Calibri" panose="020F0502020204030204" pitchFamily="34" charset="0"/>
-              </a:rPr>
-              <a:t>  50kDa</a:t>
-            </a:r>
-          </a:p>
-        </p:txBody>
-      </p:sp>
-      <p:cxnSp>
-        <p:nvCxnSpPr>
-          <p:cNvPr id="512" name="Straight Arrow Connector 511">
-            <a:extLst>
-              <a:ext uri="{FF2B5EF4-FFF2-40B4-BE49-F238E27FC236}">
-                <a16:creationId xmlns:a16="http://schemas.microsoft.com/office/drawing/2014/main" id="{2845F7E3-A86C-6A45-8610-C4BBC253B92D}"/>
+                <a16:creationId xmlns:a16="http://schemas.microsoft.com/office/drawing/2014/main" id="{CFC0703C-625A-4744-B0F2-B8E22DE60195}"/>
               </a:ext>
             </a:extLst>
           </p:cNvPr>
@@ -9285,7 +8928,7 @@
         </p:nvCxnSpPr>
         <p:spPr>
           <a:xfrm flipH="1">
-            <a:off x="10203102" y="2109240"/>
+            <a:off x="10203102" y="4629520"/>
             <a:ext cx="197923" cy="0"/>
           </a:xfrm>
           <a:prstGeom prst="straightConnector1">
@@ -9315,100 +8958,12 @@
           </a:fontRef>
         </p:style>
       </p:cxnSp>
-      <p:cxnSp>
-        <p:nvCxnSpPr>
-          <p:cNvPr id="513" name="Straight Arrow Connector 512">
+      <p:sp>
+        <p:nvSpPr>
+          <p:cNvPr id="123" name="TextBox 122">
             <a:extLst>
               <a:ext uri="{FF2B5EF4-FFF2-40B4-BE49-F238E27FC236}">
-                <a16:creationId xmlns:a16="http://schemas.microsoft.com/office/drawing/2014/main" id="{EF8F9213-EDB4-BF47-A261-0A844156C31E}"/>
-              </a:ext>
-            </a:extLst>
-          </p:cNvPr>
-          <p:cNvCxnSpPr/>
-          <p:nvPr/>
-        </p:nvCxnSpPr>
-        <p:spPr>
-          <a:xfrm flipH="1">
-            <a:off x="10203102" y="2829392"/>
-            <a:ext cx="197923" cy="0"/>
-          </a:xfrm>
-          <a:prstGeom prst="straightConnector1">
-            <a:avLst/>
-          </a:prstGeom>
-          <a:ln w="12700">
-            <a:solidFill>
-              <a:srgbClr val="7030A0"/>
-            </a:solidFill>
-            <a:prstDash val="solid"/>
-            <a:headEnd type="none" w="med" len="med"/>
-            <a:tailEnd type="triangle" w="med" len="med"/>
-          </a:ln>
-        </p:spPr>
-        <p:style>
-          <a:lnRef idx="1">
-            <a:schemeClr val="accent1"/>
-          </a:lnRef>
-          <a:fillRef idx="0">
-            <a:schemeClr val="accent1"/>
-          </a:fillRef>
-          <a:effectRef idx="0">
-            <a:schemeClr val="accent1"/>
-          </a:effectRef>
-          <a:fontRef idx="minor">
-            <a:schemeClr val="tx1"/>
-          </a:fontRef>
-        </p:style>
-      </p:cxnSp>
-      <p:cxnSp>
-        <p:nvCxnSpPr>
-          <p:cNvPr id="514" name="Straight Arrow Connector 513">
-            <a:extLst>
-              <a:ext uri="{FF2B5EF4-FFF2-40B4-BE49-F238E27FC236}">
-                <a16:creationId xmlns:a16="http://schemas.microsoft.com/office/drawing/2014/main" id="{55A15413-BACD-FB43-B3B6-916A4FD04FCA}"/>
-              </a:ext>
-            </a:extLst>
-          </p:cNvPr>
-          <p:cNvCxnSpPr/>
-          <p:nvPr/>
-        </p:nvCxnSpPr>
-        <p:spPr>
-          <a:xfrm flipH="1">
-            <a:off x="10203102" y="3189080"/>
-            <a:ext cx="197923" cy="0"/>
-          </a:xfrm>
-          <a:prstGeom prst="straightConnector1">
-            <a:avLst/>
-          </a:prstGeom>
-          <a:ln w="12700">
-            <a:solidFill>
-              <a:srgbClr val="C00000"/>
-            </a:solidFill>
-            <a:prstDash val="solid"/>
-            <a:headEnd type="none" w="med" len="med"/>
-            <a:tailEnd type="triangle" w="med" len="med"/>
-          </a:ln>
-        </p:spPr>
-        <p:style>
-          <a:lnRef idx="1">
-            <a:schemeClr val="accent1"/>
-          </a:lnRef>
-          <a:fillRef idx="0">
-            <a:schemeClr val="accent1"/>
-          </a:fillRef>
-          <a:effectRef idx="0">
-            <a:schemeClr val="accent1"/>
-          </a:effectRef>
-          <a:fontRef idx="minor">
-            <a:schemeClr val="tx1"/>
-          </a:fontRef>
-        </p:style>
-      </p:cxnSp>
-      <p:sp>
-        <p:nvSpPr>
-          <p:cNvPr id="515" name="TextBox 514">
-            <a:extLst>
-              <a:ext uri="{FF2B5EF4-FFF2-40B4-BE49-F238E27FC236}">
-                <a16:creationId xmlns:a16="http://schemas.microsoft.com/office/drawing/2014/main" id="{9AF93EA7-5375-3A4D-8FFF-09F1CD801C67}"/>
+                <a16:creationId xmlns:a16="http://schemas.microsoft.com/office/drawing/2014/main" id="{6D979174-1BBE-6645-9AB0-66100D6468E7}"/>
               </a:ext>
             </a:extLst>
           </p:cNvPr>
@@ -9417,164 +8972,6 @@
         </p:nvSpPr>
         <p:spPr>
           <a:xfrm>
-            <a:off x="10365046" y="3058998"/>
-            <a:ext cx="2375939" cy="261610"/>
-          </a:xfrm>
-          <a:prstGeom prst="rect">
-            <a:avLst/>
-          </a:prstGeom>
-          <a:noFill/>
-        </p:spPr>
-        <p:txBody>
-          <a:bodyPr wrap="square" rtlCol="0">
-            <a:spAutoFit/>
-          </a:bodyPr>
-          <a:lstStyle/>
-          <a:p>
-            <a:r>
-              <a:rPr lang="en-GB" sz="1100" b="1" dirty="0">
-                <a:latin typeface="Calibri" panose="020F0502020204030204" pitchFamily="34" charset="0"/>
-                <a:cs typeface="Calibri" panose="020F0502020204030204" pitchFamily="34" charset="0"/>
-              </a:rPr>
-              <a:t>Termination product (g6) - 36.9kDa</a:t>
-            </a:r>
-          </a:p>
-        </p:txBody>
-      </p:sp>
-      <p:sp>
-        <p:nvSpPr>
-          <p:cNvPr id="516" name="TextBox 515">
-            <a:extLst>
-              <a:ext uri="{FF2B5EF4-FFF2-40B4-BE49-F238E27FC236}">
-                <a16:creationId xmlns:a16="http://schemas.microsoft.com/office/drawing/2014/main" id="{76F89F7D-3F78-2D45-AE7F-46E075C8432B}"/>
-              </a:ext>
-            </a:extLst>
-          </p:cNvPr>
-          <p:cNvSpPr txBox="1"/>
-          <p:nvPr/>
-        </p:nvSpPr>
-        <p:spPr>
-          <a:xfrm>
-            <a:off x="10365048" y="2698998"/>
-            <a:ext cx="2087653" cy="261610"/>
-          </a:xfrm>
-          <a:prstGeom prst="rect">
-            <a:avLst/>
-          </a:prstGeom>
-          <a:noFill/>
-        </p:spPr>
-        <p:txBody>
-          <a:bodyPr wrap="square" rtlCol="0">
-            <a:spAutoFit/>
-          </a:bodyPr>
-          <a:lstStyle/>
-          <a:p>
-            <a:r>
-              <a:rPr lang="en-GB" sz="1100" b="1" dirty="0">
-                <a:latin typeface="Calibri" panose="020F0502020204030204" pitchFamily="34" charset="0"/>
-                <a:cs typeface="Calibri" panose="020F0502020204030204" pitchFamily="34" charset="0"/>
-              </a:rPr>
-              <a:t>Recode product g6_7 - 52.4 kDa</a:t>
-            </a:r>
-          </a:p>
-        </p:txBody>
-      </p:sp>
-      <p:sp>
-        <p:nvSpPr>
-          <p:cNvPr id="517" name="TextBox 516">
-            <a:extLst>
-              <a:ext uri="{FF2B5EF4-FFF2-40B4-BE49-F238E27FC236}">
-                <a16:creationId xmlns:a16="http://schemas.microsoft.com/office/drawing/2014/main" id="{0E023629-DFBB-5947-98A4-D349391A2B5B}"/>
-              </a:ext>
-            </a:extLst>
-          </p:cNvPr>
-          <p:cNvSpPr txBox="1"/>
-          <p:nvPr/>
-        </p:nvSpPr>
-        <p:spPr>
-          <a:xfrm>
-            <a:off x="10365048" y="1978998"/>
-            <a:ext cx="2428512" cy="261610"/>
-          </a:xfrm>
-          <a:prstGeom prst="rect">
-            <a:avLst/>
-          </a:prstGeom>
-          <a:noFill/>
-        </p:spPr>
-        <p:txBody>
-          <a:bodyPr wrap="square" rtlCol="0">
-            <a:spAutoFit/>
-          </a:bodyPr>
-          <a:lstStyle/>
-          <a:p>
-            <a:r>
-              <a:rPr lang="en-GB" sz="1100" b="1" dirty="0">
-                <a:latin typeface="Calibri" panose="020F0502020204030204" pitchFamily="34" charset="0"/>
-                <a:cs typeface="Calibri" panose="020F0502020204030204" pitchFamily="34" charset="0"/>
-              </a:rPr>
-              <a:t>Recode product g6_7_8 - 113.2 kDa</a:t>
-            </a:r>
-          </a:p>
-        </p:txBody>
-      </p:sp>
-      <p:cxnSp>
-        <p:nvCxnSpPr>
-          <p:cNvPr id="518" name="Straight Arrow Connector 517">
-            <a:extLst>
-              <a:ext uri="{FF2B5EF4-FFF2-40B4-BE49-F238E27FC236}">
-                <a16:creationId xmlns:a16="http://schemas.microsoft.com/office/drawing/2014/main" id="{575E4CC9-99F2-DB48-956A-2FAF2C9DCE34}"/>
-              </a:ext>
-            </a:extLst>
-          </p:cNvPr>
-          <p:cNvCxnSpPr/>
-          <p:nvPr/>
-        </p:nvCxnSpPr>
-        <p:spPr>
-          <a:xfrm flipH="1">
-            <a:off x="10203102" y="4629520"/>
-            <a:ext cx="197923" cy="0"/>
-          </a:xfrm>
-          <a:prstGeom prst="straightConnector1">
-            <a:avLst/>
-          </a:prstGeom>
-          <a:ln w="12700">
-            <a:solidFill>
-              <a:srgbClr val="7030A0"/>
-            </a:solidFill>
-            <a:prstDash val="solid"/>
-            <a:headEnd type="none" w="med" len="med"/>
-            <a:tailEnd type="triangle" w="med" len="med"/>
-          </a:ln>
-        </p:spPr>
-        <p:style>
-          <a:lnRef idx="1">
-            <a:schemeClr val="accent1"/>
-          </a:lnRef>
-          <a:fillRef idx="0">
-            <a:schemeClr val="accent1"/>
-          </a:fillRef>
-          <a:effectRef idx="0">
-            <a:schemeClr val="accent1"/>
-          </a:effectRef>
-          <a:fontRef idx="minor">
-            <a:schemeClr val="tx1"/>
-          </a:fontRef>
-        </p:style>
-      </p:cxnSp>
-      <p:sp>
-        <p:nvSpPr>
-          <p:cNvPr id="519" name="TextBox 518">
-            <a:extLst>
-              <a:ext uri="{FF2B5EF4-FFF2-40B4-BE49-F238E27FC236}">
-                <a16:creationId xmlns:a16="http://schemas.microsoft.com/office/drawing/2014/main" id="{AC361765-E0D2-514D-8F49-B60B11FEE050}"/>
-              </a:ext>
-            </a:extLst>
-          </p:cNvPr>
-          <p:cNvSpPr txBox="1"/>
-          <p:nvPr/>
-        </p:nvSpPr>
-        <p:spPr>
-          <a:xfrm>
             <a:off x="10365047" y="4498998"/>
             <a:ext cx="2641410" cy="261610"/>
           </a:xfrm>
@@ -9601,10 +8998,10 @@
       </p:sp>
       <p:sp>
         <p:nvSpPr>
-          <p:cNvPr id="520" name="Rectangle 519">
+          <p:cNvPr id="124" name="Rectangle 123">
             <a:extLst>
               <a:ext uri="{FF2B5EF4-FFF2-40B4-BE49-F238E27FC236}">
-                <a16:creationId xmlns:a16="http://schemas.microsoft.com/office/drawing/2014/main" id="{3C77AA11-8221-024C-9CA9-CF13D57B0752}"/>
+                <a16:creationId xmlns:a16="http://schemas.microsoft.com/office/drawing/2014/main" id="{2CDC30E7-232A-8B42-B2C6-CBE1A437C229}"/>
               </a:ext>
             </a:extLst>
           </p:cNvPr>
@@ -9613,7 +9010,7 @@
         </p:nvSpPr>
         <p:spPr>
           <a:xfrm>
-            <a:off x="1469513" y="476385"/>
+            <a:off x="1469513" y="491300"/>
             <a:ext cx="500067" cy="252000"/>
           </a:xfrm>
           <a:prstGeom prst="rect">
@@ -9656,10 +9053,10 @@
       </p:sp>
       <p:sp>
         <p:nvSpPr>
-          <p:cNvPr id="521" name="Rectangle 520">
+          <p:cNvPr id="125" name="Rectangle 124">
             <a:extLst>
               <a:ext uri="{FF2B5EF4-FFF2-40B4-BE49-F238E27FC236}">
-                <a16:creationId xmlns:a16="http://schemas.microsoft.com/office/drawing/2014/main" id="{E36DF92B-3DD8-B844-A0FD-F0F5946D913F}"/>
+                <a16:creationId xmlns:a16="http://schemas.microsoft.com/office/drawing/2014/main" id="{EA4056FF-4918-904C-B59E-998371C9EF0A}"/>
               </a:ext>
             </a:extLst>
           </p:cNvPr>
@@ -9668,7 +9065,7 @@
         </p:nvSpPr>
         <p:spPr>
           <a:xfrm>
-            <a:off x="965841" y="476385"/>
+            <a:off x="965841" y="491300"/>
             <a:ext cx="500067" cy="252000"/>
           </a:xfrm>
           <a:prstGeom prst="rect">
@@ -9711,10 +9108,10 @@
       </p:sp>
       <p:sp>
         <p:nvSpPr>
-          <p:cNvPr id="522" name="TextBox 521">
+          <p:cNvPr id="126" name="TextBox 125">
             <a:extLst>
               <a:ext uri="{FF2B5EF4-FFF2-40B4-BE49-F238E27FC236}">
-                <a16:creationId xmlns:a16="http://schemas.microsoft.com/office/drawing/2014/main" id="{950A9DF4-9B3A-5340-A8B4-2D273AC7922B}"/>
+                <a16:creationId xmlns:a16="http://schemas.microsoft.com/office/drawing/2014/main" id="{88D781A6-11B7-1541-803C-F50E929C1A98}"/>
               </a:ext>
             </a:extLst>
           </p:cNvPr>
@@ -9723,7 +9120,7 @@
         </p:nvSpPr>
         <p:spPr>
           <a:xfrm>
-            <a:off x="965457" y="469647"/>
+            <a:off x="965457" y="484562"/>
             <a:ext cx="928695" cy="276999"/>
           </a:xfrm>
           <a:prstGeom prst="rect">
@@ -9753,10 +9150,10 @@
       </p:sp>
       <p:sp>
         <p:nvSpPr>
-          <p:cNvPr id="523" name="TextBox 522">
+          <p:cNvPr id="127" name="TextBox 126">
             <a:extLst>
               <a:ext uri="{FF2B5EF4-FFF2-40B4-BE49-F238E27FC236}">
-                <a16:creationId xmlns:a16="http://schemas.microsoft.com/office/drawing/2014/main" id="{4E9B2830-B889-254A-9A3A-6EDBE7464F78}"/>
+                <a16:creationId xmlns:a16="http://schemas.microsoft.com/office/drawing/2014/main" id="{62D97BC6-EEBD-8043-AE22-D19D1C2248D5}"/>
               </a:ext>
             </a:extLst>
           </p:cNvPr>
@@ -9765,7 +9162,7 @@
         </p:nvSpPr>
         <p:spPr>
           <a:xfrm>
-            <a:off x="1551211" y="452923"/>
+            <a:off x="1551211" y="467838"/>
             <a:ext cx="928695" cy="276999"/>
           </a:xfrm>
           <a:prstGeom prst="rect">
@@ -9795,10 +9192,10 @@
       </p:sp>
       <p:sp>
         <p:nvSpPr>
-          <p:cNvPr id="524" name="Rectangle 523">
+          <p:cNvPr id="128" name="Rectangle 127">
             <a:extLst>
               <a:ext uri="{FF2B5EF4-FFF2-40B4-BE49-F238E27FC236}">
-                <a16:creationId xmlns:a16="http://schemas.microsoft.com/office/drawing/2014/main" id="{F838114E-55DF-0A4D-AAC7-63CEA5B65D0A}"/>
+                <a16:creationId xmlns:a16="http://schemas.microsoft.com/office/drawing/2014/main" id="{ACB44CB0-DC4E-7148-870E-D72E235C7218}"/>
               </a:ext>
             </a:extLst>
           </p:cNvPr>
@@ -9807,7 +9204,7 @@
         </p:nvSpPr>
         <p:spPr>
           <a:xfrm>
-            <a:off x="1479203" y="1528748"/>
+            <a:off x="1479203" y="1543663"/>
             <a:ext cx="500067" cy="252000"/>
           </a:xfrm>
           <a:prstGeom prst="rect">
@@ -9850,10 +9247,10 @@
       </p:sp>
       <p:sp>
         <p:nvSpPr>
-          <p:cNvPr id="525" name="TextBox 524">
+          <p:cNvPr id="129" name="TextBox 128">
             <a:extLst>
               <a:ext uri="{FF2B5EF4-FFF2-40B4-BE49-F238E27FC236}">
-                <a16:creationId xmlns:a16="http://schemas.microsoft.com/office/drawing/2014/main" id="{65286E52-5DA3-7F45-9E4E-FFB63984A4A9}"/>
+                <a16:creationId xmlns:a16="http://schemas.microsoft.com/office/drawing/2014/main" id="{F7DE8365-60EA-9044-A3C0-0C50E46911D9}"/>
               </a:ext>
             </a:extLst>
           </p:cNvPr>
@@ -9862,7 +9259,7 @@
         </p:nvSpPr>
         <p:spPr>
           <a:xfrm>
-            <a:off x="1479204" y="1772150"/>
+            <a:off x="1479204" y="1787065"/>
             <a:ext cx="928695" cy="253916"/>
           </a:xfrm>
           <a:prstGeom prst="rect">
@@ -9892,10 +9289,10 @@
       </p:sp>
       <p:sp>
         <p:nvSpPr>
-          <p:cNvPr id="526" name="TextBox 525">
+          <p:cNvPr id="130" name="TextBox 129">
             <a:extLst>
               <a:ext uri="{FF2B5EF4-FFF2-40B4-BE49-F238E27FC236}">
-                <a16:creationId xmlns:a16="http://schemas.microsoft.com/office/drawing/2014/main" id="{82BFA9A0-D9DC-0441-8F40-E4D66EBF9754}"/>
+                <a16:creationId xmlns:a16="http://schemas.microsoft.com/office/drawing/2014/main" id="{960E863C-0ED5-054B-920B-1ECC3C8A5AE1}"/>
               </a:ext>
             </a:extLst>
           </p:cNvPr>
@@ -9904,7 +9301,7 @@
         </p:nvSpPr>
         <p:spPr>
           <a:xfrm>
-            <a:off x="2127275" y="1772150"/>
+            <a:off x="2127275" y="1787065"/>
             <a:ext cx="928695" cy="253916"/>
           </a:xfrm>
           <a:prstGeom prst="rect">
@@ -9934,10 +9331,10 @@
       </p:sp>
       <p:sp>
         <p:nvSpPr>
-          <p:cNvPr id="527" name="Rectangle 526">
+          <p:cNvPr id="131" name="Rectangle 130">
             <a:extLst>
               <a:ext uri="{FF2B5EF4-FFF2-40B4-BE49-F238E27FC236}">
-                <a16:creationId xmlns:a16="http://schemas.microsoft.com/office/drawing/2014/main" id="{517AE873-3813-E04E-9F7E-0862D5B839DD}"/>
+                <a16:creationId xmlns:a16="http://schemas.microsoft.com/office/drawing/2014/main" id="{9ABDF252-77A3-DC45-B43E-105DDE58CE88}"/>
               </a:ext>
             </a:extLst>
           </p:cNvPr>
@@ -9946,7 +9343,7 @@
         </p:nvSpPr>
         <p:spPr>
           <a:xfrm>
-            <a:off x="2122145" y="1528748"/>
+            <a:off x="2122145" y="1543663"/>
             <a:ext cx="571504" cy="252000"/>
           </a:xfrm>
           <a:prstGeom prst="rect">
@@ -9989,10 +9386,10 @@
       </p:sp>
       <p:sp>
         <p:nvSpPr>
-          <p:cNvPr id="528" name="TextBox 527">
+          <p:cNvPr id="132" name="TextBox 131">
             <a:extLst>
               <a:ext uri="{FF2B5EF4-FFF2-40B4-BE49-F238E27FC236}">
-                <a16:creationId xmlns:a16="http://schemas.microsoft.com/office/drawing/2014/main" id="{4B9D1679-3A3D-D74E-84C3-986A8B713F52}"/>
+                <a16:creationId xmlns:a16="http://schemas.microsoft.com/office/drawing/2014/main" id="{D5728FFE-178F-9A43-8604-56430BB54BD7}"/>
               </a:ext>
             </a:extLst>
           </p:cNvPr>
@@ -10001,7 +9398,7 @@
         </p:nvSpPr>
         <p:spPr>
           <a:xfrm>
-            <a:off x="1550641" y="1522010"/>
+            <a:off x="1550641" y="1536925"/>
             <a:ext cx="928695" cy="276999"/>
           </a:xfrm>
           <a:prstGeom prst="rect">
@@ -10031,10 +9428,10 @@
       </p:sp>
       <p:sp>
         <p:nvSpPr>
-          <p:cNvPr id="529" name="TextBox 528">
+          <p:cNvPr id="133" name="TextBox 132">
             <a:extLst>
               <a:ext uri="{FF2B5EF4-FFF2-40B4-BE49-F238E27FC236}">
-                <a16:creationId xmlns:a16="http://schemas.microsoft.com/office/drawing/2014/main" id="{DB3146E1-6693-E640-9AE8-685900596257}"/>
+                <a16:creationId xmlns:a16="http://schemas.microsoft.com/office/drawing/2014/main" id="{EC49460B-0074-B842-8624-3E4E6E9615A0}"/>
               </a:ext>
             </a:extLst>
           </p:cNvPr>
@@ -10043,7 +9440,7 @@
         </p:nvSpPr>
         <p:spPr>
           <a:xfrm>
-            <a:off x="2246212" y="1521339"/>
+            <a:off x="2246212" y="1536254"/>
             <a:ext cx="928695" cy="276999"/>
           </a:xfrm>
           <a:prstGeom prst="rect">
@@ -10073,10 +9470,10 @@
       </p:sp>
       <p:sp>
         <p:nvSpPr>
-          <p:cNvPr id="530" name="Freeform 529">
+          <p:cNvPr id="134" name="Freeform 133">
             <a:extLst>
               <a:ext uri="{FF2B5EF4-FFF2-40B4-BE49-F238E27FC236}">
-                <a16:creationId xmlns:a16="http://schemas.microsoft.com/office/drawing/2014/main" id="{EEFCA967-EFB7-6049-A801-C936B2569EC6}"/>
+                <a16:creationId xmlns:a16="http://schemas.microsoft.com/office/drawing/2014/main" id="{B1180C1A-1CCF-F84E-855D-DD4325985E7C}"/>
               </a:ext>
             </a:extLst>
           </p:cNvPr>
@@ -10085,7 +9482,7 @@
         </p:nvSpPr>
         <p:spPr>
           <a:xfrm>
-            <a:off x="1945949" y="1224484"/>
+            <a:off x="1945949" y="1239399"/>
             <a:ext cx="190500" cy="225425"/>
           </a:xfrm>
           <a:custGeom>
@@ -10173,10 +9570,10 @@
       </p:sp>
       <p:sp>
         <p:nvSpPr>
-          <p:cNvPr id="531" name="TextBox 530">
+          <p:cNvPr id="135" name="TextBox 134">
             <a:extLst>
               <a:ext uri="{FF2B5EF4-FFF2-40B4-BE49-F238E27FC236}">
-                <a16:creationId xmlns:a16="http://schemas.microsoft.com/office/drawing/2014/main" id="{3B735C91-4AE8-A74E-A997-EBB82892D99E}"/>
+                <a16:creationId xmlns:a16="http://schemas.microsoft.com/office/drawing/2014/main" id="{3BEC27D7-B364-2246-9C5C-BB870272E691}"/>
               </a:ext>
             </a:extLst>
           </p:cNvPr>
@@ -10185,7 +9582,7 @@
         </p:nvSpPr>
         <p:spPr>
           <a:xfrm>
-            <a:off x="1764956" y="949834"/>
+            <a:off x="1764956" y="964749"/>
             <a:ext cx="928695" cy="261610"/>
           </a:xfrm>
           <a:prstGeom prst="rect">
@@ -10215,10 +9612,10 @@
       </p:sp>
       <p:sp>
         <p:nvSpPr>
-          <p:cNvPr id="532" name="Rectangle 531">
+          <p:cNvPr id="136" name="Rectangle 135">
             <a:extLst>
               <a:ext uri="{FF2B5EF4-FFF2-40B4-BE49-F238E27FC236}">
-                <a16:creationId xmlns:a16="http://schemas.microsoft.com/office/drawing/2014/main" id="{62F64D69-03D6-664A-A894-6C564B3C2AC3}"/>
+                <a16:creationId xmlns:a16="http://schemas.microsoft.com/office/drawing/2014/main" id="{C50347C6-0CB6-4345-BDC4-557705E03228}"/>
               </a:ext>
             </a:extLst>
           </p:cNvPr>
@@ -10227,7 +9624,7 @@
         </p:nvSpPr>
         <p:spPr>
           <a:xfrm>
-            <a:off x="975531" y="1528748"/>
+            <a:off x="975531" y="1543663"/>
             <a:ext cx="500067" cy="252000"/>
           </a:xfrm>
           <a:prstGeom prst="rect">
@@ -10270,10 +9667,10 @@
       </p:sp>
       <p:sp>
         <p:nvSpPr>
-          <p:cNvPr id="533" name="TextBox 532">
+          <p:cNvPr id="137" name="TextBox 136">
             <a:extLst>
               <a:ext uri="{FF2B5EF4-FFF2-40B4-BE49-F238E27FC236}">
-                <a16:creationId xmlns:a16="http://schemas.microsoft.com/office/drawing/2014/main" id="{1673AE45-1A2E-274B-9A6B-9CFB65D06F8E}"/>
+                <a16:creationId xmlns:a16="http://schemas.microsoft.com/office/drawing/2014/main" id="{5DAB4910-FF63-0143-91F3-7776B2098FDF}"/>
               </a:ext>
             </a:extLst>
           </p:cNvPr>
@@ -10282,7 +9679,7 @@
         </p:nvSpPr>
         <p:spPr>
           <a:xfrm>
-            <a:off x="975147" y="1522010"/>
+            <a:off x="975147" y="1536925"/>
             <a:ext cx="928695" cy="276999"/>
           </a:xfrm>
           <a:prstGeom prst="rect">
@@ -10312,10 +9709,10 @@
       </p:sp>
       <p:sp>
         <p:nvSpPr>
-          <p:cNvPr id="534" name="TextBox 533">
+          <p:cNvPr id="138" name="TextBox 137">
             <a:extLst>
               <a:ext uri="{FF2B5EF4-FFF2-40B4-BE49-F238E27FC236}">
-                <a16:creationId xmlns:a16="http://schemas.microsoft.com/office/drawing/2014/main" id="{51FBB6FF-B783-5048-A53D-91CA351A461E}"/>
+                <a16:creationId xmlns:a16="http://schemas.microsoft.com/office/drawing/2014/main" id="{6C8EDFCD-1835-2C4C-8958-06D999AFCC2A}"/>
               </a:ext>
             </a:extLst>
           </p:cNvPr>
@@ -10324,7 +9721,7 @@
         </p:nvSpPr>
         <p:spPr>
           <a:xfrm>
-            <a:off x="1479203" y="692030"/>
+            <a:off x="1479203" y="706945"/>
             <a:ext cx="928695" cy="253916"/>
           </a:xfrm>
           <a:prstGeom prst="rect">
@@ -10354,10 +9751,10 @@
       </p:sp>
       <p:sp>
         <p:nvSpPr>
-          <p:cNvPr id="535" name="TextBox 534">
+          <p:cNvPr id="139" name="TextBox 138">
             <a:extLst>
               <a:ext uri="{FF2B5EF4-FFF2-40B4-BE49-F238E27FC236}">
-                <a16:creationId xmlns:a16="http://schemas.microsoft.com/office/drawing/2014/main" id="{A5610DF1-F950-1340-9617-FDB6E02DBDB5}"/>
+                <a16:creationId xmlns:a16="http://schemas.microsoft.com/office/drawing/2014/main" id="{359AC8C2-9151-A74D-8060-511C2AFBD9EE}"/>
               </a:ext>
             </a:extLst>
           </p:cNvPr>
@@ -10366,7 +9763,7 @@
         </p:nvSpPr>
         <p:spPr>
           <a:xfrm>
-            <a:off x="651531" y="469546"/>
+            <a:off x="651531" y="484461"/>
             <a:ext cx="928695" cy="276999"/>
           </a:xfrm>
           <a:prstGeom prst="rect">
@@ -10396,10 +9793,10 @@
       </p:sp>
       <p:sp>
         <p:nvSpPr>
-          <p:cNvPr id="536" name="TextBox 535">
+          <p:cNvPr id="140" name="TextBox 139">
             <a:extLst>
               <a:ext uri="{FF2B5EF4-FFF2-40B4-BE49-F238E27FC236}">
-                <a16:creationId xmlns:a16="http://schemas.microsoft.com/office/drawing/2014/main" id="{EE3496EC-4F21-B642-A63F-05DD58D31A6C}"/>
+                <a16:creationId xmlns:a16="http://schemas.microsoft.com/office/drawing/2014/main" id="{E1C2CB4E-CA40-E540-B2C5-5E81E9D99E42}"/>
               </a:ext>
             </a:extLst>
           </p:cNvPr>
@@ -10408,7 +9805,7 @@
         </p:nvSpPr>
         <p:spPr>
           <a:xfrm>
-            <a:off x="507531" y="1525898"/>
+            <a:off x="507531" y="1540813"/>
             <a:ext cx="928695" cy="276999"/>
           </a:xfrm>
           <a:prstGeom prst="rect">
@@ -10438,10 +9835,10 @@
       </p:sp>
       <p:cxnSp>
         <p:nvCxnSpPr>
-          <p:cNvPr id="537" name="Straight Connector 536">
+          <p:cNvPr id="141" name="Straight Connector 140">
             <a:extLst>
               <a:ext uri="{FF2B5EF4-FFF2-40B4-BE49-F238E27FC236}">
-                <a16:creationId xmlns:a16="http://schemas.microsoft.com/office/drawing/2014/main" id="{EB7F44AF-DA9C-1C48-92BA-5A3821619E99}"/>
+                <a16:creationId xmlns:a16="http://schemas.microsoft.com/office/drawing/2014/main" id="{E18FFCCF-B39A-D74D-A8E6-E895F4342010}"/>
               </a:ext>
             </a:extLst>
           </p:cNvPr>
@@ -10450,7 +9847,7 @@
         </p:nvCxnSpPr>
         <p:spPr>
           <a:xfrm rot="5400000">
-            <a:off x="1947530" y="613546"/>
+            <a:off x="1947530" y="628461"/>
             <a:ext cx="285752" cy="1588"/>
           </a:xfrm>
           <a:prstGeom prst="line">
@@ -10479,10 +9876,10 @@
       </p:cxnSp>
       <p:cxnSp>
         <p:nvCxnSpPr>
-          <p:cNvPr id="538" name="Straight Connector 537">
+          <p:cNvPr id="142" name="Straight Connector 141">
             <a:extLst>
               <a:ext uri="{FF2B5EF4-FFF2-40B4-BE49-F238E27FC236}">
-                <a16:creationId xmlns:a16="http://schemas.microsoft.com/office/drawing/2014/main" id="{CE1959BC-2DD8-F244-A750-99BA87779AA9}"/>
+                <a16:creationId xmlns:a16="http://schemas.microsoft.com/office/drawing/2014/main" id="{A49296E6-6215-3641-9474-D95403AA6EBB}"/>
               </a:ext>
             </a:extLst>
           </p:cNvPr>
@@ -10491,7 +9888,7 @@
         </p:nvCxnSpPr>
         <p:spPr>
           <a:xfrm rot="5400000">
-            <a:off x="2705272" y="1679426"/>
+            <a:off x="2705272" y="1694341"/>
             <a:ext cx="285752" cy="1588"/>
           </a:xfrm>
           <a:prstGeom prst="line">
@@ -10520,10 +9917,10 @@
       </p:cxnSp>
       <p:sp>
         <p:nvSpPr>
-          <p:cNvPr id="539" name="TextBox 538">
+          <p:cNvPr id="143" name="TextBox 142">
             <a:extLst>
               <a:ext uri="{FF2B5EF4-FFF2-40B4-BE49-F238E27FC236}">
-                <a16:creationId xmlns:a16="http://schemas.microsoft.com/office/drawing/2014/main" id="{0303BF0E-C609-6443-A955-32D8F6616ABC}"/>
+                <a16:creationId xmlns:a16="http://schemas.microsoft.com/office/drawing/2014/main" id="{1B50393A-07AD-DD40-A4D1-9FB8719D554A}"/>
               </a:ext>
             </a:extLst>
           </p:cNvPr>
@@ -10562,10 +9959,10 @@
       </p:sp>
       <p:sp>
         <p:nvSpPr>
-          <p:cNvPr id="540" name="TextBox 539">
+          <p:cNvPr id="144" name="TextBox 143">
             <a:extLst>
               <a:ext uri="{FF2B5EF4-FFF2-40B4-BE49-F238E27FC236}">
-                <a16:creationId xmlns:a16="http://schemas.microsoft.com/office/drawing/2014/main" id="{265A8A3D-D4AF-9247-8032-59F419C8849E}"/>
+                <a16:creationId xmlns:a16="http://schemas.microsoft.com/office/drawing/2014/main" id="{7F23DE5A-F9F0-8845-B896-D6D391ECD9A2}"/>
               </a:ext>
             </a:extLst>
           </p:cNvPr>
@@ -10574,7 +9971,7 @@
         </p:nvSpPr>
         <p:spPr>
           <a:xfrm>
-            <a:off x="2824974" y="1531571"/>
+            <a:off x="2824974" y="1546486"/>
             <a:ext cx="928695" cy="253916"/>
           </a:xfrm>
           <a:prstGeom prst="rect">
@@ -10604,10 +10001,10 @@
       </p:sp>
       <p:sp>
         <p:nvSpPr>
-          <p:cNvPr id="541" name="TextBox 540">
+          <p:cNvPr id="145" name="TextBox 144">
             <a:extLst>
               <a:ext uri="{FF2B5EF4-FFF2-40B4-BE49-F238E27FC236}">
-                <a16:creationId xmlns:a16="http://schemas.microsoft.com/office/drawing/2014/main" id="{206A9DF9-A193-4C4E-AF5B-0000DCE300C4}"/>
+                <a16:creationId xmlns:a16="http://schemas.microsoft.com/office/drawing/2014/main" id="{BB77D0CD-8575-2E4A-A0CC-46A103407580}"/>
               </a:ext>
             </a:extLst>
           </p:cNvPr>
@@ -10616,7 +10013,7 @@
         </p:nvSpPr>
         <p:spPr>
           <a:xfrm>
-            <a:off x="2078164" y="482744"/>
+            <a:off x="2078164" y="497659"/>
             <a:ext cx="928695" cy="253916"/>
           </a:xfrm>
           <a:prstGeom prst="rect">
@@ -10647,7 +10044,7 @@
     </p:spTree>
     <p:extLst>
       <p:ext uri="{BB962C8B-B14F-4D97-AF65-F5344CB8AC3E}">
-        <p14:creationId xmlns:p14="http://schemas.microsoft.com/office/powerpoint/2010/main" val="523581316"/>
+        <p14:creationId xmlns:p14="http://schemas.microsoft.com/office/powerpoint/2010/main" val="2827168227"/>
       </p:ext>
     </p:extLst>
   </p:cSld>

</xml_diff>